<commit_message>
Slides for Demo 4
</commit_message>
<xml_diff>
--- a/MOCUIPlugin-Demo4.pptx
+++ b/MOCUIPlugin-Demo4.pptx
@@ -5,7 +5,7 @@
     <p:sldMasterId id="2147483648" r:id="rId2"/>
   </p:sldMasterIdLst>
   <p:notesMasterIdLst>
-    <p:notesMasterId r:id="rId17"/>
+    <p:notesMasterId r:id="rId16"/>
   </p:notesMasterIdLst>
   <p:sldIdLst>
     <p:sldId id="256" r:id="rId3"/>
@@ -19,9 +19,8 @@
     <p:sldId id="276" r:id="rId11"/>
     <p:sldId id="278" r:id="rId12"/>
     <p:sldId id="272" r:id="rId13"/>
-    <p:sldId id="273" r:id="rId14"/>
-    <p:sldId id="271" r:id="rId15"/>
-    <p:sldId id="265" r:id="rId16"/>
+    <p:sldId id="271" r:id="rId14"/>
+    <p:sldId id="265" r:id="rId15"/>
   </p:sldIdLst>
   <p:sldSz cx="9144000" cy="5143500" type="screen16x9"/>
   <p:notesSz cx="6858000" cy="9144000"/>
@@ -3391,26 +3390,26 @@
     </dgm:pt>
   </dgm:ptLst>
   <dgm:cxnLst>
-    <dgm:cxn modelId="{7F53A127-DC11-441C-BA04-237AC4FE7D11}" type="presOf" srcId="{B90755AD-2F18-4178-83EB-A2120718733B}" destId="{9F7CA0FC-75A3-4EA9-A3DF-E61A1FE159BC}" srcOrd="0" destOrd="0" presId="urn:microsoft.com/office/officeart/2008/layout/NameandTitleOrganizationalChart"/>
+    <dgm:cxn modelId="{38C0A0F4-1759-41B1-97CB-B6382EDB212E}" type="presOf" srcId="{D540B663-5BFA-4B74-8F48-CBBFE3B12C9C}" destId="{B284F8D3-E72D-499A-A12F-4C8D7E0CB7FC}" srcOrd="1" destOrd="0" presId="urn:microsoft.com/office/officeart/2008/layout/NameandTitleOrganizationalChart"/>
+    <dgm:cxn modelId="{D020E709-EFE1-4D59-B1F5-4773B8ED5347}" type="presOf" srcId="{44525E0D-A614-454D-B527-85A9DD18FE1C}" destId="{9234C8BB-D254-499A-9C36-BA272DBBEB10}" srcOrd="0" destOrd="0" presId="urn:microsoft.com/office/officeart/2008/layout/NameandTitleOrganizationalChart"/>
+    <dgm:cxn modelId="{C1D130D8-D4DB-4362-BB4F-4C8A29AE82B9}" type="presOf" srcId="{68D7C4E0-2687-4ADE-A8D2-C9F2D001E585}" destId="{31526FA4-0910-4501-80BE-BC5814B05CD0}" srcOrd="0" destOrd="0" presId="urn:microsoft.com/office/officeart/2008/layout/NameandTitleOrganizationalChart"/>
+    <dgm:cxn modelId="{1EEBFA79-6682-4B32-B394-146263BE4779}" type="presOf" srcId="{56697E52-AADE-4056-B6BE-6F13BD1CF381}" destId="{7CA9E5A9-0401-40F3-8070-7B576D0F4A45}" srcOrd="0" destOrd="0" presId="urn:microsoft.com/office/officeart/2008/layout/NameandTitleOrganizationalChart"/>
+    <dgm:cxn modelId="{F7F8BEA6-F24E-4B64-BBAB-29748BF6DA4E}" type="presOf" srcId="{FFD4D3BD-C01E-427A-A03E-E15EF3C6F762}" destId="{40BCE0C3-DD38-41FF-9B2D-133F9C1069E0}" srcOrd="0" destOrd="0" presId="urn:microsoft.com/office/officeart/2008/layout/NameandTitleOrganizationalChart"/>
+    <dgm:cxn modelId="{9D9F5B87-183C-4BB1-8C4B-4728ACF979CF}" type="presOf" srcId="{D540B663-5BFA-4B74-8F48-CBBFE3B12C9C}" destId="{2CBF305B-8A45-4A22-9451-E4423C449E09}" srcOrd="0" destOrd="0" presId="urn:microsoft.com/office/officeart/2008/layout/NameandTitleOrganizationalChart"/>
     <dgm:cxn modelId="{190BD391-7173-42A4-83EF-BC68AA182B59}" type="presOf" srcId="{A39A2D05-D581-47DA-A62D-CA6E6F472AD5}" destId="{A639E0FE-6548-4948-A17A-C1C18040DF6E}" srcOrd="0" destOrd="0" presId="urn:microsoft.com/office/officeart/2008/layout/NameandTitleOrganizationalChart"/>
-    <dgm:cxn modelId="{38C0A0F4-1759-41B1-97CB-B6382EDB212E}" type="presOf" srcId="{D540B663-5BFA-4B74-8F48-CBBFE3B12C9C}" destId="{B284F8D3-E72D-499A-A12F-4C8D7E0CB7FC}" srcOrd="1" destOrd="0" presId="urn:microsoft.com/office/officeart/2008/layout/NameandTitleOrganizationalChart"/>
-    <dgm:cxn modelId="{110E6A02-B232-4287-A976-120B6D96957C}" srcId="{56697E52-AADE-4056-B6BE-6F13BD1CF381}" destId="{D540B663-5BFA-4B74-8F48-CBBFE3B12C9C}" srcOrd="1" destOrd="0" parTransId="{8CF85BBB-2E2B-41BC-A2E0-AFFEE7FD5A87}" sibTransId="{A39A2D05-D581-47DA-A62D-CA6E6F472AD5}"/>
-    <dgm:cxn modelId="{80A6F0A7-7CBD-4CEB-99DF-42A5A517A01F}" srcId="{89F2759A-4735-4ADB-A3EE-43CBC490F477}" destId="{56697E52-AADE-4056-B6BE-6F13BD1CF381}" srcOrd="0" destOrd="0" parTransId="{1325CF2E-69A0-409D-B04B-D6AA99D69035}" sibTransId="{D9A52C7E-C984-4849-9D7B-94F589399AF3}"/>
-    <dgm:cxn modelId="{CBE9FDB8-FDB9-43F8-A443-FCBBDC9676E0}" type="presOf" srcId="{D9A52C7E-C984-4849-9D7B-94F589399AF3}" destId="{D5B18486-331E-4E15-A115-BA00544F74B3}" srcOrd="0" destOrd="0" presId="urn:microsoft.com/office/officeart/2008/layout/NameandTitleOrganizationalChart"/>
-    <dgm:cxn modelId="{BAB1BF9D-C8C7-4369-B1A3-94D045A5DB1A}" type="presOf" srcId="{2B5FE461-88C1-4D18-AE4C-F63D1E6AD74F}" destId="{2450682B-9C32-4254-A511-FC81F1905EA1}" srcOrd="0" destOrd="0" presId="urn:microsoft.com/office/officeart/2008/layout/NameandTitleOrganizationalChart"/>
-    <dgm:cxn modelId="{9D9F5B87-183C-4BB1-8C4B-4728ACF979CF}" type="presOf" srcId="{D540B663-5BFA-4B74-8F48-CBBFE3B12C9C}" destId="{2CBF305B-8A45-4A22-9451-E4423C449E09}" srcOrd="0" destOrd="0" presId="urn:microsoft.com/office/officeart/2008/layout/NameandTitleOrganizationalChart"/>
-    <dgm:cxn modelId="{8ECB8929-6F09-4A13-A379-800589C3B2C6}" type="presOf" srcId="{2B5FE461-88C1-4D18-AE4C-F63D1E6AD74F}" destId="{567B6576-E619-4516-B320-56093EA9B377}" srcOrd="1" destOrd="0" presId="urn:microsoft.com/office/officeart/2008/layout/NameandTitleOrganizationalChart"/>
-    <dgm:cxn modelId="{07E6F41B-A47D-4DE2-A2D3-F418E0BEBBCE}" srcId="{56697E52-AADE-4056-B6BE-6F13BD1CF381}" destId="{68D7C4E0-2687-4ADE-A8D2-C9F2D001E585}" srcOrd="0" destOrd="0" parTransId="{FFD4D3BD-C01E-427A-A03E-E15EF3C6F762}" sibTransId="{44525E0D-A614-454D-B527-85A9DD18FE1C}"/>
     <dgm:cxn modelId="{03505726-9C2F-4B7D-81E4-88C44F1C4D28}" type="presOf" srcId="{56697E52-AADE-4056-B6BE-6F13BD1CF381}" destId="{42FB3674-59FC-4BA7-8A7B-20D0E0BDD762}" srcOrd="1" destOrd="0" presId="urn:microsoft.com/office/officeart/2008/layout/NameandTitleOrganizationalChart"/>
     <dgm:cxn modelId="{A09D9892-8F40-4DE0-BDA1-D6E1713AD3ED}" type="presOf" srcId="{8CF85BBB-2E2B-41BC-A2E0-AFFEE7FD5A87}" destId="{FEA330ED-9A4F-421D-AB06-89F45CBB56A4}" srcOrd="0" destOrd="0" presId="urn:microsoft.com/office/officeart/2008/layout/NameandTitleOrganizationalChart"/>
-    <dgm:cxn modelId="{D020E709-EFE1-4D59-B1F5-4773B8ED5347}" type="presOf" srcId="{44525E0D-A614-454D-B527-85A9DD18FE1C}" destId="{9234C8BB-D254-499A-9C36-BA272DBBEB10}" srcOrd="0" destOrd="0" presId="urn:microsoft.com/office/officeart/2008/layout/NameandTitleOrganizationalChart"/>
-    <dgm:cxn modelId="{1EEBFA79-6682-4B32-B394-146263BE4779}" type="presOf" srcId="{56697E52-AADE-4056-B6BE-6F13BD1CF381}" destId="{7CA9E5A9-0401-40F3-8070-7B576D0F4A45}" srcOrd="0" destOrd="0" presId="urn:microsoft.com/office/officeart/2008/layout/NameandTitleOrganizationalChart"/>
+    <dgm:cxn modelId="{110E6A02-B232-4287-A976-120B6D96957C}" srcId="{56697E52-AADE-4056-B6BE-6F13BD1CF381}" destId="{D540B663-5BFA-4B74-8F48-CBBFE3B12C9C}" srcOrd="1" destOrd="0" parTransId="{8CF85BBB-2E2B-41BC-A2E0-AFFEE7FD5A87}" sibTransId="{A39A2D05-D581-47DA-A62D-CA6E6F472AD5}"/>
+    <dgm:cxn modelId="{C19A676C-E819-461E-A42C-4746428E7759}" srcId="{56697E52-AADE-4056-B6BE-6F13BD1CF381}" destId="{2B5FE461-88C1-4D18-AE4C-F63D1E6AD74F}" srcOrd="2" destOrd="0" parTransId="{B90755AD-2F18-4178-83EB-A2120718733B}" sibTransId="{19B9AF33-E84B-4777-B927-6E0916B2F89D}"/>
+    <dgm:cxn modelId="{80A6F0A7-7CBD-4CEB-99DF-42A5A517A01F}" srcId="{89F2759A-4735-4ADB-A3EE-43CBC490F477}" destId="{56697E52-AADE-4056-B6BE-6F13BD1CF381}" srcOrd="0" destOrd="0" parTransId="{1325CF2E-69A0-409D-B04B-D6AA99D69035}" sibTransId="{D9A52C7E-C984-4849-9D7B-94F589399AF3}"/>
+    <dgm:cxn modelId="{3EAD132F-EA59-49FE-83C1-37759E696057}" type="presOf" srcId="{19B9AF33-E84B-4777-B927-6E0916B2F89D}" destId="{03CA9C2F-41CA-4FD0-A92D-69A6DF5FB5F7}" srcOrd="0" destOrd="0" presId="urn:microsoft.com/office/officeart/2008/layout/NameandTitleOrganizationalChart"/>
+    <dgm:cxn modelId="{BAB1BF9D-C8C7-4369-B1A3-94D045A5DB1A}" type="presOf" srcId="{2B5FE461-88C1-4D18-AE4C-F63D1E6AD74F}" destId="{2450682B-9C32-4254-A511-FC81F1905EA1}" srcOrd="0" destOrd="0" presId="urn:microsoft.com/office/officeart/2008/layout/NameandTitleOrganizationalChart"/>
+    <dgm:cxn modelId="{07E6F41B-A47D-4DE2-A2D3-F418E0BEBBCE}" srcId="{56697E52-AADE-4056-B6BE-6F13BD1CF381}" destId="{68D7C4E0-2687-4ADE-A8D2-C9F2D001E585}" srcOrd="0" destOrd="0" parTransId="{FFD4D3BD-C01E-427A-A03E-E15EF3C6F762}" sibTransId="{44525E0D-A614-454D-B527-85A9DD18FE1C}"/>
+    <dgm:cxn modelId="{CBE9FDB8-FDB9-43F8-A443-FCBBDC9676E0}" type="presOf" srcId="{D9A52C7E-C984-4849-9D7B-94F589399AF3}" destId="{D5B18486-331E-4E15-A115-BA00544F74B3}" srcOrd="0" destOrd="0" presId="urn:microsoft.com/office/officeart/2008/layout/NameandTitleOrganizationalChart"/>
+    <dgm:cxn modelId="{8ECB8929-6F09-4A13-A379-800589C3B2C6}" type="presOf" srcId="{2B5FE461-88C1-4D18-AE4C-F63D1E6AD74F}" destId="{567B6576-E619-4516-B320-56093EA9B377}" srcOrd="1" destOrd="0" presId="urn:microsoft.com/office/officeart/2008/layout/NameandTitleOrganizationalChart"/>
+    <dgm:cxn modelId="{9B6133E4-10F8-4357-B1B0-EC336BE5609A}" type="presOf" srcId="{89F2759A-4735-4ADB-A3EE-43CBC490F477}" destId="{70B3DFA5-88A3-477C-922A-CFEA818C8F70}" srcOrd="0" destOrd="0" presId="urn:microsoft.com/office/officeart/2008/layout/NameandTitleOrganizationalChart"/>
     <dgm:cxn modelId="{C9DF309F-0B54-4F2F-A93F-9B925637BA2A}" type="presOf" srcId="{68D7C4E0-2687-4ADE-A8D2-C9F2D001E585}" destId="{70674121-7958-4D2E-88AF-CF5E50EE46F8}" srcOrd="1" destOrd="0" presId="urn:microsoft.com/office/officeart/2008/layout/NameandTitleOrganizationalChart"/>
-    <dgm:cxn modelId="{C19A676C-E819-461E-A42C-4746428E7759}" srcId="{56697E52-AADE-4056-B6BE-6F13BD1CF381}" destId="{2B5FE461-88C1-4D18-AE4C-F63D1E6AD74F}" srcOrd="2" destOrd="0" parTransId="{B90755AD-2F18-4178-83EB-A2120718733B}" sibTransId="{19B9AF33-E84B-4777-B927-6E0916B2F89D}"/>
-    <dgm:cxn modelId="{9B6133E4-10F8-4357-B1B0-EC336BE5609A}" type="presOf" srcId="{89F2759A-4735-4ADB-A3EE-43CBC490F477}" destId="{70B3DFA5-88A3-477C-922A-CFEA818C8F70}" srcOrd="0" destOrd="0" presId="urn:microsoft.com/office/officeart/2008/layout/NameandTitleOrganizationalChart"/>
-    <dgm:cxn modelId="{C1D130D8-D4DB-4362-BB4F-4C8A29AE82B9}" type="presOf" srcId="{68D7C4E0-2687-4ADE-A8D2-C9F2D001E585}" destId="{31526FA4-0910-4501-80BE-BC5814B05CD0}" srcOrd="0" destOrd="0" presId="urn:microsoft.com/office/officeart/2008/layout/NameandTitleOrganizationalChart"/>
-    <dgm:cxn modelId="{3EAD132F-EA59-49FE-83C1-37759E696057}" type="presOf" srcId="{19B9AF33-E84B-4777-B927-6E0916B2F89D}" destId="{03CA9C2F-41CA-4FD0-A92D-69A6DF5FB5F7}" srcOrd="0" destOrd="0" presId="urn:microsoft.com/office/officeart/2008/layout/NameandTitleOrganizationalChart"/>
-    <dgm:cxn modelId="{F7F8BEA6-F24E-4B64-BBAB-29748BF6DA4E}" type="presOf" srcId="{FFD4D3BD-C01E-427A-A03E-E15EF3C6F762}" destId="{40BCE0C3-DD38-41FF-9B2D-133F9C1069E0}" srcOrd="0" destOrd="0" presId="urn:microsoft.com/office/officeart/2008/layout/NameandTitleOrganizationalChart"/>
+    <dgm:cxn modelId="{7F53A127-DC11-441C-BA04-237AC4FE7D11}" type="presOf" srcId="{B90755AD-2F18-4178-83EB-A2120718733B}" destId="{9F7CA0FC-75A3-4EA9-A3DF-E61A1FE159BC}" srcOrd="0" destOrd="0" presId="urn:microsoft.com/office/officeart/2008/layout/NameandTitleOrganizationalChart"/>
     <dgm:cxn modelId="{965CC138-886F-4755-AE63-59FD89E9F11D}" type="presParOf" srcId="{70B3DFA5-88A3-477C-922A-CFEA818C8F70}" destId="{8BED5C40-FF2E-4B01-8702-B45BA1CFDB71}" srcOrd="0" destOrd="0" presId="urn:microsoft.com/office/officeart/2008/layout/NameandTitleOrganizationalChart"/>
     <dgm:cxn modelId="{2395D624-54A0-4B38-A924-A10325CFE02C}" type="presParOf" srcId="{8BED5C40-FF2E-4B01-8702-B45BA1CFDB71}" destId="{1DABA2AE-78D5-43B1-B0A4-432E02BB2B7F}" srcOrd="0" destOrd="0" presId="urn:microsoft.com/office/officeart/2008/layout/NameandTitleOrganizationalChart"/>
     <dgm:cxn modelId="{9EA573AF-2D3F-467F-A178-3BEA872BF28C}" type="presParOf" srcId="{1DABA2AE-78D5-43B1-B0A4-432E02BB2B7F}" destId="{7CA9E5A9-0401-40F3-8070-7B576D0F4A45}" srcOrd="0" destOrd="0" presId="urn:microsoft.com/office/officeart/2008/layout/NameandTitleOrganizationalChart"/>
@@ -4299,41 +4298,41 @@
     </dgm:pt>
   </dgm:ptLst>
   <dgm:cxnLst>
+    <dgm:cxn modelId="{B891A863-A658-442D-B2DC-C070A4413763}" type="presOf" srcId="{2B5FE461-88C1-4D18-AE4C-F63D1E6AD74F}" destId="{2450682B-9C32-4254-A511-FC81F1905EA1}" srcOrd="0" destOrd="0" presId="urn:microsoft.com/office/officeart/2008/layout/NameandTitleOrganizationalChart"/>
+    <dgm:cxn modelId="{E32AA45E-2D41-4EB2-BCF5-B9CD588B325A}" type="presOf" srcId="{D9A52C7E-C984-4849-9D7B-94F589399AF3}" destId="{D5B18486-331E-4E15-A115-BA00544F74B3}" srcOrd="0" destOrd="0" presId="urn:microsoft.com/office/officeart/2008/layout/NameandTitleOrganizationalChart"/>
+    <dgm:cxn modelId="{846CD2C4-D8F3-423A-9D4C-E7EE13CC7CA0}" type="presOf" srcId="{FFD4D3BD-C01E-427A-A03E-E15EF3C6F762}" destId="{40BCE0C3-DD38-41FF-9B2D-133F9C1069E0}" srcOrd="0" destOrd="0" presId="urn:microsoft.com/office/officeart/2008/layout/NameandTitleOrganizationalChart"/>
+    <dgm:cxn modelId="{C217FC12-9913-4F4D-8E44-D122182E8404}" type="presOf" srcId="{ADADAD12-C16C-4687-B7B6-88A69B299E3A}" destId="{1D6DBE54-1201-45DE-B8D0-C3B3B9F7A860}" srcOrd="0" destOrd="0" presId="urn:microsoft.com/office/officeart/2008/layout/NameandTitleOrganizationalChart"/>
+    <dgm:cxn modelId="{04DDC6F3-1191-47BF-BF99-B6B568E7CFE8}" type="presOf" srcId="{6670EC82-986C-4C13-8499-BFFD1E533534}" destId="{C94229A2-5703-45BE-9E2A-0374FA6FD0B0}" srcOrd="0" destOrd="0" presId="urn:microsoft.com/office/officeart/2008/layout/NameandTitleOrganizationalChart"/>
+    <dgm:cxn modelId="{80A6F0A7-7CBD-4CEB-99DF-42A5A517A01F}" srcId="{89F2759A-4735-4ADB-A3EE-43CBC490F477}" destId="{56697E52-AADE-4056-B6BE-6F13BD1CF381}" srcOrd="0" destOrd="0" parTransId="{1325CF2E-69A0-409D-B04B-D6AA99D69035}" sibTransId="{D9A52C7E-C984-4849-9D7B-94F589399AF3}"/>
+    <dgm:cxn modelId="{F4063430-7DB1-47D3-9A6B-AF5D11C06583}" type="presOf" srcId="{A39A2D05-D581-47DA-A62D-CA6E6F472AD5}" destId="{A639E0FE-6548-4948-A17A-C1C18040DF6E}" srcOrd="0" destOrd="0" presId="urn:microsoft.com/office/officeart/2008/layout/NameandTitleOrganizationalChart"/>
+    <dgm:cxn modelId="{AB6EF513-28DE-476A-83FF-F1E5ABB1CCD0}" type="presOf" srcId="{89F2759A-4735-4ADB-A3EE-43CBC490F477}" destId="{70B3DFA5-88A3-477C-922A-CFEA818C8F70}" srcOrd="0" destOrd="0" presId="urn:microsoft.com/office/officeart/2008/layout/NameandTitleOrganizationalChart"/>
+    <dgm:cxn modelId="{F155CE00-DA09-4897-A36C-7F4CCCEE402E}" type="presOf" srcId="{91EBF273-7B12-451F-95DD-4AF373318C7A}" destId="{72E76C14-CC89-48C7-BA54-AD6B3DC6D4E3}" srcOrd="0" destOrd="0" presId="urn:microsoft.com/office/officeart/2008/layout/NameandTitleOrganizationalChart"/>
+    <dgm:cxn modelId="{C8F06B2C-C1A3-43A2-A64E-08A664ADBF52}" type="presOf" srcId="{F678BEAC-1303-4084-96E5-8A50F84BB69F}" destId="{BA1D7C01-8C5E-4C5B-BE9E-F3B3186D5F1A}" srcOrd="1" destOrd="0" presId="urn:microsoft.com/office/officeart/2008/layout/NameandTitleOrganizationalChart"/>
+    <dgm:cxn modelId="{472B57DB-57C3-4CFB-BB2E-F75668A930F1}" srcId="{2B5FE461-88C1-4D18-AE4C-F63D1E6AD74F}" destId="{D5E13001-A65A-4CA0-9F51-2D794B55BFF0}" srcOrd="0" destOrd="0" parTransId="{E752988D-D174-4163-96E9-F5CD78E4D76C}" sibTransId="{68F28304-8602-49C0-BF3D-2CB69A03D841}"/>
+    <dgm:cxn modelId="{E3FE2CF0-654B-4604-BA65-45DA3A1A0B04}" type="presOf" srcId="{D5E13001-A65A-4CA0-9F51-2D794B55BFF0}" destId="{4D78201E-0FC5-402D-9174-4AA604F9EBD1}" srcOrd="1" destOrd="0" presId="urn:microsoft.com/office/officeart/2008/layout/NameandTitleOrganizationalChart"/>
+    <dgm:cxn modelId="{2E095CCE-3CAC-4722-8403-A6EC13356244}" type="presOf" srcId="{8CF85BBB-2E2B-41BC-A2E0-AFFEE7FD5A87}" destId="{FEA330ED-9A4F-421D-AB06-89F45CBB56A4}" srcOrd="0" destOrd="0" presId="urn:microsoft.com/office/officeart/2008/layout/NameandTitleOrganizationalChart"/>
+    <dgm:cxn modelId="{E110FA66-80CC-4897-B804-28CC098E52A1}" type="presOf" srcId="{19B9AF33-E84B-4777-B927-6E0916B2F89D}" destId="{03CA9C2F-41CA-4FD0-A92D-69A6DF5FB5F7}" srcOrd="0" destOrd="0" presId="urn:microsoft.com/office/officeart/2008/layout/NameandTitleOrganizationalChart"/>
+    <dgm:cxn modelId="{E5CFD8C4-F152-4507-A138-118C4F3317D0}" type="presOf" srcId="{70643935-346A-496B-8A78-8A02F32C0F1E}" destId="{E141C824-9CAC-4476-B8A9-65519E38AE46}" srcOrd="1" destOrd="0" presId="urn:microsoft.com/office/officeart/2008/layout/NameandTitleOrganizationalChart"/>
+    <dgm:cxn modelId="{110E6A02-B232-4287-A976-120B6D96957C}" srcId="{56697E52-AADE-4056-B6BE-6F13BD1CF381}" destId="{D540B663-5BFA-4B74-8F48-CBBFE3B12C9C}" srcOrd="1" destOrd="0" parTransId="{8CF85BBB-2E2B-41BC-A2E0-AFFEE7FD5A87}" sibTransId="{A39A2D05-D581-47DA-A62D-CA6E6F472AD5}"/>
+    <dgm:cxn modelId="{0FE08152-025F-43CB-AB08-47EB338723EC}" type="presOf" srcId="{D5E13001-A65A-4CA0-9F51-2D794B55BFF0}" destId="{69A7C693-CDE9-4A8C-8FE8-0ED95030A74C}" srcOrd="0" destOrd="0" presId="urn:microsoft.com/office/officeart/2008/layout/NameandTitleOrganizationalChart"/>
+    <dgm:cxn modelId="{45D25CD8-599A-4BCD-B7E0-2F95E2239724}" type="presOf" srcId="{68D7C4E0-2687-4ADE-A8D2-C9F2D001E585}" destId="{31526FA4-0910-4501-80BE-BC5814B05CD0}" srcOrd="0" destOrd="0" presId="urn:microsoft.com/office/officeart/2008/layout/NameandTitleOrganizationalChart"/>
+    <dgm:cxn modelId="{C19A676C-E819-461E-A42C-4746428E7759}" srcId="{56697E52-AADE-4056-B6BE-6F13BD1CF381}" destId="{2B5FE461-88C1-4D18-AE4C-F63D1E6AD74F}" srcOrd="2" destOrd="0" parTransId="{B90755AD-2F18-4178-83EB-A2120718733B}" sibTransId="{19B9AF33-E84B-4777-B927-6E0916B2F89D}"/>
+    <dgm:cxn modelId="{F851F866-3B9E-45D8-8AC7-7BB26AB84FA5}" type="presOf" srcId="{68D7C4E0-2687-4ADE-A8D2-C9F2D001E585}" destId="{70674121-7958-4D2E-88AF-CF5E50EE46F8}" srcOrd="1" destOrd="0" presId="urn:microsoft.com/office/officeart/2008/layout/NameandTitleOrganizationalChart"/>
+    <dgm:cxn modelId="{08387EB7-90BA-4479-810B-1E2E6036EA2A}" type="presOf" srcId="{F678BEAC-1303-4084-96E5-8A50F84BB69F}" destId="{7399316D-1F4E-4902-991A-7751ED03ADCC}" srcOrd="0" destOrd="0" presId="urn:microsoft.com/office/officeart/2008/layout/NameandTitleOrganizationalChart"/>
+    <dgm:cxn modelId="{07E6F41B-A47D-4DE2-A2D3-F418E0BEBBCE}" srcId="{56697E52-AADE-4056-B6BE-6F13BD1CF381}" destId="{68D7C4E0-2687-4ADE-A8D2-C9F2D001E585}" srcOrd="0" destOrd="0" parTransId="{FFD4D3BD-C01E-427A-A03E-E15EF3C6F762}" sibTransId="{44525E0D-A614-454D-B527-85A9DD18FE1C}"/>
+    <dgm:cxn modelId="{BF040303-C1F3-46B2-812F-E9537AF6B3A5}" type="presOf" srcId="{70643935-346A-496B-8A78-8A02F32C0F1E}" destId="{69A071B1-3CEF-4CDC-A4A4-8A0326963EC5}" srcOrd="0" destOrd="0" presId="urn:microsoft.com/office/officeart/2008/layout/NameandTitleOrganizationalChart"/>
+    <dgm:cxn modelId="{AAA34B11-F6D0-401E-97C3-E76F9A297E9C}" type="presOf" srcId="{2B5FE461-88C1-4D18-AE4C-F63D1E6AD74F}" destId="{567B6576-E619-4516-B320-56093EA9B377}" srcOrd="1" destOrd="0" presId="urn:microsoft.com/office/officeart/2008/layout/NameandTitleOrganizationalChart"/>
+    <dgm:cxn modelId="{E4538C48-3471-494E-AE4E-F848DE39164A}" srcId="{D540B663-5BFA-4B74-8F48-CBBFE3B12C9C}" destId="{70643935-346A-496B-8A78-8A02F32C0F1E}" srcOrd="0" destOrd="0" parTransId="{6670EC82-986C-4C13-8499-BFFD1E533534}" sibTransId="{91EBF273-7B12-451F-95DD-4AF373318C7A}"/>
+    <dgm:cxn modelId="{A0FC8F25-BEA2-4A91-AF72-21899B44739E}" type="presOf" srcId="{D540B663-5BFA-4B74-8F48-CBBFE3B12C9C}" destId="{B284F8D3-E72D-499A-A12F-4C8D7E0CB7FC}" srcOrd="1" destOrd="0" presId="urn:microsoft.com/office/officeart/2008/layout/NameandTitleOrganizationalChart"/>
+    <dgm:cxn modelId="{2D03F82E-CD42-4273-8801-1F14FAC30F02}" type="presOf" srcId="{56697E52-AADE-4056-B6BE-6F13BD1CF381}" destId="{42FB3674-59FC-4BA7-8A7B-20D0E0BDD762}" srcOrd="1" destOrd="0" presId="urn:microsoft.com/office/officeart/2008/layout/NameandTitleOrganizationalChart"/>
+    <dgm:cxn modelId="{D59C857B-11DC-4C69-8BEC-E8FACC2B3347}" type="presOf" srcId="{D540B663-5BFA-4B74-8F48-CBBFE3B12C9C}" destId="{2CBF305B-8A45-4A22-9451-E4423C449E09}" srcOrd="0" destOrd="0" presId="urn:microsoft.com/office/officeart/2008/layout/NameandTitleOrganizationalChart"/>
+    <dgm:cxn modelId="{8DBC64EB-B7D9-4F4C-BA54-6C9ECAD87478}" type="presOf" srcId="{68F28304-8602-49C0-BF3D-2CB69A03D841}" destId="{310CA05A-41C9-4E06-A91A-6639E9D64A34}" srcOrd="0" destOrd="0" presId="urn:microsoft.com/office/officeart/2008/layout/NameandTitleOrganizationalChart"/>
+    <dgm:cxn modelId="{2493A7D7-D4D6-4839-8CA9-4C2E1A03D36F}" type="presOf" srcId="{E752988D-D174-4163-96E9-F5CD78E4D76C}" destId="{314C0B78-8F40-4082-9AF2-CFFA721CAFAA}" srcOrd="0" destOrd="0" presId="urn:microsoft.com/office/officeart/2008/layout/NameandTitleOrganizationalChart"/>
+    <dgm:cxn modelId="{589B4D09-2A3E-4165-BDB6-F5F433B4AC45}" srcId="{68D7C4E0-2687-4ADE-A8D2-C9F2D001E585}" destId="{F678BEAC-1303-4084-96E5-8A50F84BB69F}" srcOrd="0" destOrd="0" parTransId="{7DD156DF-042A-4ED4-941C-18BA714AFE1D}" sibTransId="{ADADAD12-C16C-4687-B7B6-88A69B299E3A}"/>
+    <dgm:cxn modelId="{6A59EBBB-DCCF-4724-9034-B32FD3F03A6F}" type="presOf" srcId="{B90755AD-2F18-4178-83EB-A2120718733B}" destId="{9F7CA0FC-75A3-4EA9-A3DF-E61A1FE159BC}" srcOrd="0" destOrd="0" presId="urn:microsoft.com/office/officeart/2008/layout/NameandTitleOrganizationalChart"/>
+    <dgm:cxn modelId="{036A4C8A-E4EF-4D55-AB31-ECA6BB8DE7E7}" type="presOf" srcId="{44525E0D-A614-454D-B527-85A9DD18FE1C}" destId="{9234C8BB-D254-499A-9C36-BA272DBBEB10}" srcOrd="0" destOrd="0" presId="urn:microsoft.com/office/officeart/2008/layout/NameandTitleOrganizationalChart"/>
     <dgm:cxn modelId="{FD7B9D2F-7B4F-45CC-AD35-2F76501E739E}" type="presOf" srcId="{56697E52-AADE-4056-B6BE-6F13BD1CF381}" destId="{7CA9E5A9-0401-40F3-8070-7B576D0F4A45}" srcOrd="0" destOrd="0" presId="urn:microsoft.com/office/officeart/2008/layout/NameandTitleOrganizationalChart"/>
-    <dgm:cxn modelId="{2E095CCE-3CAC-4722-8403-A6EC13356244}" type="presOf" srcId="{8CF85BBB-2E2B-41BC-A2E0-AFFEE7FD5A87}" destId="{FEA330ED-9A4F-421D-AB06-89F45CBB56A4}" srcOrd="0" destOrd="0" presId="urn:microsoft.com/office/officeart/2008/layout/NameandTitleOrganizationalChart"/>
-    <dgm:cxn modelId="{472B57DB-57C3-4CFB-BB2E-F75668A930F1}" srcId="{2B5FE461-88C1-4D18-AE4C-F63D1E6AD74F}" destId="{D5E13001-A65A-4CA0-9F51-2D794B55BFF0}" srcOrd="0" destOrd="0" parTransId="{E752988D-D174-4163-96E9-F5CD78E4D76C}" sibTransId="{68F28304-8602-49C0-BF3D-2CB69A03D841}"/>
-    <dgm:cxn modelId="{0FE08152-025F-43CB-AB08-47EB338723EC}" type="presOf" srcId="{D5E13001-A65A-4CA0-9F51-2D794B55BFF0}" destId="{69A7C693-CDE9-4A8C-8FE8-0ED95030A74C}" srcOrd="0" destOrd="0" presId="urn:microsoft.com/office/officeart/2008/layout/NameandTitleOrganizationalChart"/>
-    <dgm:cxn modelId="{C217FC12-9913-4F4D-8E44-D122182E8404}" type="presOf" srcId="{ADADAD12-C16C-4687-B7B6-88A69B299E3A}" destId="{1D6DBE54-1201-45DE-B8D0-C3B3B9F7A860}" srcOrd="0" destOrd="0" presId="urn:microsoft.com/office/officeart/2008/layout/NameandTitleOrganizationalChart"/>
-    <dgm:cxn modelId="{8DBC64EB-B7D9-4F4C-BA54-6C9ECAD87478}" type="presOf" srcId="{68F28304-8602-49C0-BF3D-2CB69A03D841}" destId="{310CA05A-41C9-4E06-A91A-6639E9D64A34}" srcOrd="0" destOrd="0" presId="urn:microsoft.com/office/officeart/2008/layout/NameandTitleOrganizationalChart"/>
-    <dgm:cxn modelId="{6A59EBBB-DCCF-4724-9034-B32FD3F03A6F}" type="presOf" srcId="{B90755AD-2F18-4178-83EB-A2120718733B}" destId="{9F7CA0FC-75A3-4EA9-A3DF-E61A1FE159BC}" srcOrd="0" destOrd="0" presId="urn:microsoft.com/office/officeart/2008/layout/NameandTitleOrganizationalChart"/>
-    <dgm:cxn modelId="{2D03F82E-CD42-4273-8801-1F14FAC30F02}" type="presOf" srcId="{56697E52-AADE-4056-B6BE-6F13BD1CF381}" destId="{42FB3674-59FC-4BA7-8A7B-20D0E0BDD762}" srcOrd="1" destOrd="0" presId="urn:microsoft.com/office/officeart/2008/layout/NameandTitleOrganizationalChart"/>
-    <dgm:cxn modelId="{80A6F0A7-7CBD-4CEB-99DF-42A5A517A01F}" srcId="{89F2759A-4735-4ADB-A3EE-43CBC490F477}" destId="{56697E52-AADE-4056-B6BE-6F13BD1CF381}" srcOrd="0" destOrd="0" parTransId="{1325CF2E-69A0-409D-B04B-D6AA99D69035}" sibTransId="{D9A52C7E-C984-4849-9D7B-94F589399AF3}"/>
-    <dgm:cxn modelId="{07E6F41B-A47D-4DE2-A2D3-F418E0BEBBCE}" srcId="{56697E52-AADE-4056-B6BE-6F13BD1CF381}" destId="{68D7C4E0-2687-4ADE-A8D2-C9F2D001E585}" srcOrd="0" destOrd="0" parTransId="{FFD4D3BD-C01E-427A-A03E-E15EF3C6F762}" sibTransId="{44525E0D-A614-454D-B527-85A9DD18FE1C}"/>
-    <dgm:cxn modelId="{A0FC8F25-BEA2-4A91-AF72-21899B44739E}" type="presOf" srcId="{D540B663-5BFA-4B74-8F48-CBBFE3B12C9C}" destId="{B284F8D3-E72D-499A-A12F-4C8D7E0CB7FC}" srcOrd="1" destOrd="0" presId="urn:microsoft.com/office/officeart/2008/layout/NameandTitleOrganizationalChart"/>
-    <dgm:cxn modelId="{036A4C8A-E4EF-4D55-AB31-ECA6BB8DE7E7}" type="presOf" srcId="{44525E0D-A614-454D-B527-85A9DD18FE1C}" destId="{9234C8BB-D254-499A-9C36-BA272DBBEB10}" srcOrd="0" destOrd="0" presId="urn:microsoft.com/office/officeart/2008/layout/NameandTitleOrganizationalChart"/>
-    <dgm:cxn modelId="{846CD2C4-D8F3-423A-9D4C-E7EE13CC7CA0}" type="presOf" srcId="{FFD4D3BD-C01E-427A-A03E-E15EF3C6F762}" destId="{40BCE0C3-DD38-41FF-9B2D-133F9C1069E0}" srcOrd="0" destOrd="0" presId="urn:microsoft.com/office/officeart/2008/layout/NameandTitleOrganizationalChart"/>
-    <dgm:cxn modelId="{F851F866-3B9E-45D8-8AC7-7BB26AB84FA5}" type="presOf" srcId="{68D7C4E0-2687-4ADE-A8D2-C9F2D001E585}" destId="{70674121-7958-4D2E-88AF-CF5E50EE46F8}" srcOrd="1" destOrd="0" presId="urn:microsoft.com/office/officeart/2008/layout/NameandTitleOrganizationalChart"/>
-    <dgm:cxn modelId="{E5CFD8C4-F152-4507-A138-118C4F3317D0}" type="presOf" srcId="{70643935-346A-496B-8A78-8A02F32C0F1E}" destId="{E141C824-9CAC-4476-B8A9-65519E38AE46}" srcOrd="1" destOrd="0" presId="urn:microsoft.com/office/officeart/2008/layout/NameandTitleOrganizationalChart"/>
-    <dgm:cxn modelId="{589B4D09-2A3E-4165-BDB6-F5F433B4AC45}" srcId="{68D7C4E0-2687-4ADE-A8D2-C9F2D001E585}" destId="{F678BEAC-1303-4084-96E5-8A50F84BB69F}" srcOrd="0" destOrd="0" parTransId="{7DD156DF-042A-4ED4-941C-18BA714AFE1D}" sibTransId="{ADADAD12-C16C-4687-B7B6-88A69B299E3A}"/>
-    <dgm:cxn modelId="{08387EB7-90BA-4479-810B-1E2E6036EA2A}" type="presOf" srcId="{F678BEAC-1303-4084-96E5-8A50F84BB69F}" destId="{7399316D-1F4E-4902-991A-7751ED03ADCC}" srcOrd="0" destOrd="0" presId="urn:microsoft.com/office/officeart/2008/layout/NameandTitleOrganizationalChart"/>
-    <dgm:cxn modelId="{110E6A02-B232-4287-A976-120B6D96957C}" srcId="{56697E52-AADE-4056-B6BE-6F13BD1CF381}" destId="{D540B663-5BFA-4B74-8F48-CBBFE3B12C9C}" srcOrd="1" destOrd="0" parTransId="{8CF85BBB-2E2B-41BC-A2E0-AFFEE7FD5A87}" sibTransId="{A39A2D05-D581-47DA-A62D-CA6E6F472AD5}"/>
-    <dgm:cxn modelId="{45D25CD8-599A-4BCD-B7E0-2F95E2239724}" type="presOf" srcId="{68D7C4E0-2687-4ADE-A8D2-C9F2D001E585}" destId="{31526FA4-0910-4501-80BE-BC5814B05CD0}" srcOrd="0" destOrd="0" presId="urn:microsoft.com/office/officeart/2008/layout/NameandTitleOrganizationalChart"/>
-    <dgm:cxn modelId="{04DDC6F3-1191-47BF-BF99-B6B568E7CFE8}" type="presOf" srcId="{6670EC82-986C-4C13-8499-BFFD1E533534}" destId="{C94229A2-5703-45BE-9E2A-0374FA6FD0B0}" srcOrd="0" destOrd="0" presId="urn:microsoft.com/office/officeart/2008/layout/NameandTitleOrganizationalChart"/>
-    <dgm:cxn modelId="{D59C857B-11DC-4C69-8BEC-E8FACC2B3347}" type="presOf" srcId="{D540B663-5BFA-4B74-8F48-CBBFE3B12C9C}" destId="{2CBF305B-8A45-4A22-9451-E4423C449E09}" srcOrd="0" destOrd="0" presId="urn:microsoft.com/office/officeart/2008/layout/NameandTitleOrganizationalChart"/>
-    <dgm:cxn modelId="{AB6EF513-28DE-476A-83FF-F1E5ABB1CCD0}" type="presOf" srcId="{89F2759A-4735-4ADB-A3EE-43CBC490F477}" destId="{70B3DFA5-88A3-477C-922A-CFEA818C8F70}" srcOrd="0" destOrd="0" presId="urn:microsoft.com/office/officeart/2008/layout/NameandTitleOrganizationalChart"/>
-    <dgm:cxn modelId="{E4538C48-3471-494E-AE4E-F848DE39164A}" srcId="{D540B663-5BFA-4B74-8F48-CBBFE3B12C9C}" destId="{70643935-346A-496B-8A78-8A02F32C0F1E}" srcOrd="0" destOrd="0" parTransId="{6670EC82-986C-4C13-8499-BFFD1E533534}" sibTransId="{91EBF273-7B12-451F-95DD-4AF373318C7A}"/>
-    <dgm:cxn modelId="{F155CE00-DA09-4897-A36C-7F4CCCEE402E}" type="presOf" srcId="{91EBF273-7B12-451F-95DD-4AF373318C7A}" destId="{72E76C14-CC89-48C7-BA54-AD6B3DC6D4E3}" srcOrd="0" destOrd="0" presId="urn:microsoft.com/office/officeart/2008/layout/NameandTitleOrganizationalChart"/>
-    <dgm:cxn modelId="{E3FE2CF0-654B-4604-BA65-45DA3A1A0B04}" type="presOf" srcId="{D5E13001-A65A-4CA0-9F51-2D794B55BFF0}" destId="{4D78201E-0FC5-402D-9174-4AA604F9EBD1}" srcOrd="1" destOrd="0" presId="urn:microsoft.com/office/officeart/2008/layout/NameandTitleOrganizationalChart"/>
-    <dgm:cxn modelId="{AAA34B11-F6D0-401E-97C3-E76F9A297E9C}" type="presOf" srcId="{2B5FE461-88C1-4D18-AE4C-F63D1E6AD74F}" destId="{567B6576-E619-4516-B320-56093EA9B377}" srcOrd="1" destOrd="0" presId="urn:microsoft.com/office/officeart/2008/layout/NameandTitleOrganizationalChart"/>
-    <dgm:cxn modelId="{E110FA66-80CC-4897-B804-28CC098E52A1}" type="presOf" srcId="{19B9AF33-E84B-4777-B927-6E0916B2F89D}" destId="{03CA9C2F-41CA-4FD0-A92D-69A6DF5FB5F7}" srcOrd="0" destOrd="0" presId="urn:microsoft.com/office/officeart/2008/layout/NameandTitleOrganizationalChart"/>
-    <dgm:cxn modelId="{2493A7D7-D4D6-4839-8CA9-4C2E1A03D36F}" type="presOf" srcId="{E752988D-D174-4163-96E9-F5CD78E4D76C}" destId="{314C0B78-8F40-4082-9AF2-CFFA721CAFAA}" srcOrd="0" destOrd="0" presId="urn:microsoft.com/office/officeart/2008/layout/NameandTitleOrganizationalChart"/>
-    <dgm:cxn modelId="{E32AA45E-2D41-4EB2-BCF5-B9CD588B325A}" type="presOf" srcId="{D9A52C7E-C984-4849-9D7B-94F589399AF3}" destId="{D5B18486-331E-4E15-A115-BA00544F74B3}" srcOrd="0" destOrd="0" presId="urn:microsoft.com/office/officeart/2008/layout/NameandTitleOrganizationalChart"/>
     <dgm:cxn modelId="{8D93F23B-E137-4AF0-BDEA-365977C6C4F8}" type="presOf" srcId="{7DD156DF-042A-4ED4-941C-18BA714AFE1D}" destId="{19B64637-948F-499E-9226-402FDF1919EC}" srcOrd="0" destOrd="0" presId="urn:microsoft.com/office/officeart/2008/layout/NameandTitleOrganizationalChart"/>
-    <dgm:cxn modelId="{BF040303-C1F3-46B2-812F-E9537AF6B3A5}" type="presOf" srcId="{70643935-346A-496B-8A78-8A02F32C0F1E}" destId="{69A071B1-3CEF-4CDC-A4A4-8A0326963EC5}" srcOrd="0" destOrd="0" presId="urn:microsoft.com/office/officeart/2008/layout/NameandTitleOrganizationalChart"/>
-    <dgm:cxn modelId="{C19A676C-E819-461E-A42C-4746428E7759}" srcId="{56697E52-AADE-4056-B6BE-6F13BD1CF381}" destId="{2B5FE461-88C1-4D18-AE4C-F63D1E6AD74F}" srcOrd="2" destOrd="0" parTransId="{B90755AD-2F18-4178-83EB-A2120718733B}" sibTransId="{19B9AF33-E84B-4777-B927-6E0916B2F89D}"/>
-    <dgm:cxn modelId="{F4063430-7DB1-47D3-9A6B-AF5D11C06583}" type="presOf" srcId="{A39A2D05-D581-47DA-A62D-CA6E6F472AD5}" destId="{A639E0FE-6548-4948-A17A-C1C18040DF6E}" srcOrd="0" destOrd="0" presId="urn:microsoft.com/office/officeart/2008/layout/NameandTitleOrganizationalChart"/>
-    <dgm:cxn modelId="{C8F06B2C-C1A3-43A2-A64E-08A664ADBF52}" type="presOf" srcId="{F678BEAC-1303-4084-96E5-8A50F84BB69F}" destId="{BA1D7C01-8C5E-4C5B-BE9E-F3B3186D5F1A}" srcOrd="1" destOrd="0" presId="urn:microsoft.com/office/officeart/2008/layout/NameandTitleOrganizationalChart"/>
-    <dgm:cxn modelId="{B891A863-A658-442D-B2DC-C070A4413763}" type="presOf" srcId="{2B5FE461-88C1-4D18-AE4C-F63D1E6AD74F}" destId="{2450682B-9C32-4254-A511-FC81F1905EA1}" srcOrd="0" destOrd="0" presId="urn:microsoft.com/office/officeart/2008/layout/NameandTitleOrganizationalChart"/>
     <dgm:cxn modelId="{967269E3-65C3-4ED7-99DE-A0921176C44E}" type="presParOf" srcId="{70B3DFA5-88A3-477C-922A-CFEA818C8F70}" destId="{8BED5C40-FF2E-4B01-8702-B45BA1CFDB71}" srcOrd="0" destOrd="0" presId="urn:microsoft.com/office/officeart/2008/layout/NameandTitleOrganizationalChart"/>
     <dgm:cxn modelId="{2D8DCE12-09A4-49B7-B884-CD60E1ECEC0E}" type="presParOf" srcId="{8BED5C40-FF2E-4B01-8702-B45BA1CFDB71}" destId="{1DABA2AE-78D5-43B1-B0A4-432E02BB2B7F}" srcOrd="0" destOrd="0" presId="urn:microsoft.com/office/officeart/2008/layout/NameandTitleOrganizationalChart"/>
     <dgm:cxn modelId="{5BEF4C3C-14CA-45CC-B0B1-44D109514B16}" type="presParOf" srcId="{1DABA2AE-78D5-43B1-B0A4-432E02BB2B7F}" destId="{7CA9E5A9-0401-40F3-8070-7B576D0F4A45}" srcOrd="0" destOrd="0" presId="urn:microsoft.com/office/officeart/2008/layout/NameandTitleOrganizationalChart"/>
@@ -6413,91 +6412,91 @@
     </dgm:pt>
   </dgm:ptLst>
   <dgm:cxnLst>
+    <dgm:cxn modelId="{C19A676C-E819-461E-A42C-4746428E7759}" srcId="{56697E52-AADE-4056-B6BE-6F13BD1CF381}" destId="{2B5FE461-88C1-4D18-AE4C-F63D1E6AD74F}" srcOrd="2" destOrd="0" parTransId="{B90755AD-2F18-4178-83EB-A2120718733B}" sibTransId="{19B9AF33-E84B-4777-B927-6E0916B2F89D}"/>
+    <dgm:cxn modelId="{8C1D3F1A-EC60-4376-8010-82B1D06E6F5C}" srcId="{594DF703-F6F6-47A8-AAAA-D2D1B44F85D2}" destId="{F081E3B7-74CF-4800-A009-8038376748A3}" srcOrd="0" destOrd="0" parTransId="{67626912-B424-4788-8933-B2334F8E0974}" sibTransId="{76C0F7E7-26F0-403A-9C95-304BEE7CBE6E}"/>
+    <dgm:cxn modelId="{C1F411AC-7419-4EE7-9AE3-9B66E8185FEF}" type="presOf" srcId="{B90755AD-2F18-4178-83EB-A2120718733B}" destId="{9F7CA0FC-75A3-4EA9-A3DF-E61A1FE159BC}" srcOrd="0" destOrd="0" presId="urn:microsoft.com/office/officeart/2008/layout/NameandTitleOrganizationalChart"/>
+    <dgm:cxn modelId="{4710166D-C3E9-4346-A34D-D456D681A4D1}" type="presOf" srcId="{0E6D62FF-D6C5-4E4D-818B-ED064D51807B}" destId="{64095247-A6D7-4298-8E35-83EF8550AFBF}" srcOrd="1" destOrd="0" presId="urn:microsoft.com/office/officeart/2008/layout/NameandTitleOrganizationalChart"/>
+    <dgm:cxn modelId="{B7DEBB6E-63DA-4551-B53A-9CD609A9A800}" type="presOf" srcId="{5BDFD8CD-9F2E-4679-9ABC-8CD62E22807D}" destId="{5A758C1E-8F6C-40C5-BEDF-EABDD004DD51}" srcOrd="0" destOrd="0" presId="urn:microsoft.com/office/officeart/2008/layout/NameandTitleOrganizationalChart"/>
+    <dgm:cxn modelId="{16CDBA14-C241-4CB0-A7BA-7A0767AF80F5}" srcId="{F678BEAC-1303-4084-96E5-8A50F84BB69F}" destId="{0BB396F2-BB03-431F-9865-24C774031036}" srcOrd="1" destOrd="0" parTransId="{E8348F28-C65B-4930-BA69-249A70A4C196}" sibTransId="{5BDFD8CD-9F2E-4679-9ABC-8CD62E22807D}"/>
+    <dgm:cxn modelId="{4AD93C13-A73B-462C-AD1A-82DCB8F88E32}" type="presOf" srcId="{199C6D2B-7D47-48B0-844D-C4E8BEFF156E}" destId="{A6F9C548-BF31-4D46-883F-B92582EA519B}" srcOrd="0" destOrd="0" presId="urn:microsoft.com/office/officeart/2008/layout/NameandTitleOrganizationalChart"/>
+    <dgm:cxn modelId="{C9AC642E-C416-425F-AD70-2AC1E56001F7}" type="presOf" srcId="{594DF703-F6F6-47A8-AAAA-D2D1B44F85D2}" destId="{3BCEE51B-ECE3-40B9-AB13-414DDCDFBAEC}" srcOrd="1" destOrd="0" presId="urn:microsoft.com/office/officeart/2008/layout/NameandTitleOrganizationalChart"/>
+    <dgm:cxn modelId="{7496EA68-5659-4C9E-B6BB-B1359D58BC17}" type="presOf" srcId="{44525E0D-A614-454D-B527-85A9DD18FE1C}" destId="{9234C8BB-D254-499A-9C36-BA272DBBEB10}" srcOrd="0" destOrd="0" presId="urn:microsoft.com/office/officeart/2008/layout/NameandTitleOrganizationalChart"/>
+    <dgm:cxn modelId="{919EDCF4-E0FC-4635-A3BD-D335A64503EC}" type="presOf" srcId="{9E75A283-CF8B-4FFD-AA4D-13015F3BB96B}" destId="{2AEDA269-CA41-4EF8-8031-92AA2C84432A}" srcOrd="0" destOrd="0" presId="urn:microsoft.com/office/officeart/2008/layout/NameandTitleOrganizationalChart"/>
+    <dgm:cxn modelId="{E4538C48-3471-494E-AE4E-F848DE39164A}" srcId="{D540B663-5BFA-4B74-8F48-CBBFE3B12C9C}" destId="{70643935-346A-496B-8A78-8A02F32C0F1E}" srcOrd="0" destOrd="0" parTransId="{6670EC82-986C-4C13-8499-BFFD1E533534}" sibTransId="{91EBF273-7B12-451F-95DD-4AF373318C7A}"/>
+    <dgm:cxn modelId="{9E87A104-3207-4032-B42D-70E240EE9027}" type="presOf" srcId="{68D7C4E0-2687-4ADE-A8D2-C9F2D001E585}" destId="{31526FA4-0910-4501-80BE-BC5814B05CD0}" srcOrd="0" destOrd="0" presId="urn:microsoft.com/office/officeart/2008/layout/NameandTitleOrganizationalChart"/>
+    <dgm:cxn modelId="{DB6EF65F-9900-4C5A-B551-458AF5C9950B}" type="presOf" srcId="{D540B663-5BFA-4B74-8F48-CBBFE3B12C9C}" destId="{2CBF305B-8A45-4A22-9451-E4423C449E09}" srcOrd="0" destOrd="0" presId="urn:microsoft.com/office/officeart/2008/layout/NameandTitleOrganizationalChart"/>
+    <dgm:cxn modelId="{2D83F753-8B53-4F97-8CA8-5F2403419C20}" type="presOf" srcId="{F678BEAC-1303-4084-96E5-8A50F84BB69F}" destId="{7399316D-1F4E-4902-991A-7751ED03ADCC}" srcOrd="0" destOrd="0" presId="urn:microsoft.com/office/officeart/2008/layout/NameandTitleOrganizationalChart"/>
+    <dgm:cxn modelId="{44050953-E79F-4C68-8B80-E99BD5ADBA8D}" type="presOf" srcId="{D9A52C7E-C984-4849-9D7B-94F589399AF3}" destId="{D5B18486-331E-4E15-A115-BA00544F74B3}" srcOrd="0" destOrd="0" presId="urn:microsoft.com/office/officeart/2008/layout/NameandTitleOrganizationalChart"/>
+    <dgm:cxn modelId="{F37EF844-4B0A-44C1-9C0F-A7D6D48252C3}" type="presOf" srcId="{D5E13001-A65A-4CA0-9F51-2D794B55BFF0}" destId="{69A7C693-CDE9-4A8C-8FE8-0ED95030A74C}" srcOrd="0" destOrd="0" presId="urn:microsoft.com/office/officeart/2008/layout/NameandTitleOrganizationalChart"/>
+    <dgm:cxn modelId="{DCA2EFDA-9760-4433-9C12-8359667A6BD8}" type="presOf" srcId="{70643935-346A-496B-8A78-8A02F32C0F1E}" destId="{69A071B1-3CEF-4CDC-A4A4-8A0326963EC5}" srcOrd="0" destOrd="0" presId="urn:microsoft.com/office/officeart/2008/layout/NameandTitleOrganizationalChart"/>
+    <dgm:cxn modelId="{6AE762D2-635C-4159-8930-8858611C9C04}" type="presOf" srcId="{6670EC82-986C-4C13-8499-BFFD1E533534}" destId="{C94229A2-5703-45BE-9E2A-0374FA6FD0B0}" srcOrd="0" destOrd="0" presId="urn:microsoft.com/office/officeart/2008/layout/NameandTitleOrganizationalChart"/>
+    <dgm:cxn modelId="{F8FE9ABD-9D8D-4FDA-9DA5-E7098E8D948E}" type="presOf" srcId="{539C4B8D-788C-4D1F-9C1A-D6775BD9661F}" destId="{D7E13116-220B-4069-9DBE-A8FC34928E71}" srcOrd="0" destOrd="0" presId="urn:microsoft.com/office/officeart/2008/layout/NameandTitleOrganizationalChart"/>
+    <dgm:cxn modelId="{14FB0B4A-6078-4CB7-A731-6657E7AE7028}" type="presOf" srcId="{76C0F7E7-26F0-403A-9C95-304BEE7CBE6E}" destId="{9BBFDBAF-7660-4F21-B8E1-320DD674465D}" srcOrd="0" destOrd="0" presId="urn:microsoft.com/office/officeart/2008/layout/NameandTitleOrganizationalChart"/>
+    <dgm:cxn modelId="{3A387A26-BF4F-4B79-89A4-961EB75D1DF8}" type="presOf" srcId="{0F83784A-003A-49DB-ACEA-160D0F0A3911}" destId="{0ABB2235-C64D-45A3-86EA-BEE78AAEF0B3}" srcOrd="0" destOrd="0" presId="urn:microsoft.com/office/officeart/2008/layout/NameandTitleOrganizationalChart"/>
+    <dgm:cxn modelId="{D9D6DCEB-98F3-4117-9087-ADBFD6EC7A1D}" type="presOf" srcId="{70643935-346A-496B-8A78-8A02F32C0F1E}" destId="{E141C824-9CAC-4476-B8A9-65519E38AE46}" srcOrd="1" destOrd="0" presId="urn:microsoft.com/office/officeart/2008/layout/NameandTitleOrganizationalChart"/>
+    <dgm:cxn modelId="{18E03B67-FBC2-496F-A369-62C8DB9A53A5}" type="presOf" srcId="{2B5FE461-88C1-4D18-AE4C-F63D1E6AD74F}" destId="{2450682B-9C32-4254-A511-FC81F1905EA1}" srcOrd="0" destOrd="0" presId="urn:microsoft.com/office/officeart/2008/layout/NameandTitleOrganizationalChart"/>
+    <dgm:cxn modelId="{7B3F50B3-C083-43E8-B738-DA5B61E0CEB9}" type="presOf" srcId="{6ED14776-0D34-40E4-9164-D57DE6E82AA3}" destId="{87ED3F99-82E6-4BB3-B93E-4874663EAD4A}" srcOrd="0" destOrd="0" presId="urn:microsoft.com/office/officeart/2008/layout/NameandTitleOrganizationalChart"/>
+    <dgm:cxn modelId="{0A81A221-6D97-4FA6-BF79-4AD2E79C8F08}" srcId="{70643935-346A-496B-8A78-8A02F32C0F1E}" destId="{539C4B8D-788C-4D1F-9C1A-D6775BD9661F}" srcOrd="1" destOrd="0" parTransId="{6A32BDBE-AB56-4C0A-98C4-C919A95C198E}" sibTransId="{C911AA48-CF7E-4AB2-9D77-E4073345DB11}"/>
+    <dgm:cxn modelId="{BCB43F46-AE77-405A-A960-86FD11F662B5}" type="presOf" srcId="{594DF703-F6F6-47A8-AAAA-D2D1B44F85D2}" destId="{9526CB03-3BAB-4CFF-A6E3-515CA67413A2}" srcOrd="0" destOrd="0" presId="urn:microsoft.com/office/officeart/2008/layout/NameandTitleOrganizationalChart"/>
+    <dgm:cxn modelId="{8EA736FE-8C17-45E1-ACF7-DBF72F0C358D}" type="presOf" srcId="{5144D60B-48D6-4068-A88B-E80088D42192}" destId="{C12FA5AC-F7A5-443A-9EF7-FE4FC8CC2584}" srcOrd="0" destOrd="0" presId="urn:microsoft.com/office/officeart/2008/layout/NameandTitleOrganizationalChart"/>
+    <dgm:cxn modelId="{01848FEA-8E97-4B36-82B8-D85A4CD8B583}" type="presOf" srcId="{0393F10E-5788-40A1-9256-0CC606F7C6ED}" destId="{BED8F21F-0A46-4808-94F7-78855CC1F6B6}" srcOrd="0" destOrd="0" presId="urn:microsoft.com/office/officeart/2008/layout/NameandTitleOrganizationalChart"/>
+    <dgm:cxn modelId="{D58BFEAD-A1F0-4618-8D11-09E43D0A6827}" type="presOf" srcId="{7DD156DF-042A-4ED4-941C-18BA714AFE1D}" destId="{19B64637-948F-499E-9226-402FDF1919EC}" srcOrd="0" destOrd="0" presId="urn:microsoft.com/office/officeart/2008/layout/NameandTitleOrganizationalChart"/>
+    <dgm:cxn modelId="{6AE73098-26CB-4F52-9B61-102F15DCDF40}" type="presOf" srcId="{92777329-391F-4805-8D66-7FA1269C138F}" destId="{CF11A092-9A20-43D1-A9C2-2D26C83ACADE}" srcOrd="0" destOrd="0" presId="urn:microsoft.com/office/officeart/2008/layout/NameandTitleOrganizationalChart"/>
+    <dgm:cxn modelId="{472B57DB-57C3-4CFB-BB2E-F75668A930F1}" srcId="{2B5FE461-88C1-4D18-AE4C-F63D1E6AD74F}" destId="{D5E13001-A65A-4CA0-9F51-2D794B55BFF0}" srcOrd="0" destOrd="0" parTransId="{E752988D-D174-4163-96E9-F5CD78E4D76C}" sibTransId="{68F28304-8602-49C0-BF3D-2CB69A03D841}"/>
+    <dgm:cxn modelId="{F79C439A-56D9-4D22-846E-851F10E2D810}" srcId="{70643935-346A-496B-8A78-8A02F32C0F1E}" destId="{434C9BC0-1BBE-4FF7-BA54-7053C9124D5C}" srcOrd="2" destOrd="0" parTransId="{E8F1E285-D583-4DF2-8008-9BA5D823E163}" sibTransId="{E99A997E-D705-4798-8AE7-844732E114CB}"/>
+    <dgm:cxn modelId="{1258918B-AF0F-4991-82B5-E64AB9EDBE3B}" type="presOf" srcId="{B40106DC-A9DC-42BC-904B-C31EB1EA33B6}" destId="{F10327A4-789F-4FD9-91B2-4DBE997718EE}" srcOrd="0" destOrd="0" presId="urn:microsoft.com/office/officeart/2008/layout/NameandTitleOrganizationalChart"/>
+    <dgm:cxn modelId="{B6CC2A01-D7C5-4E00-8CCC-C08A65C1045F}" type="presOf" srcId="{0EF0A87E-140C-46DE-B381-FB5A3DD5CAC1}" destId="{51424633-ED11-4939-8F22-44BE1CF0C667}" srcOrd="1" destOrd="0" presId="urn:microsoft.com/office/officeart/2008/layout/NameandTitleOrganizationalChart"/>
+    <dgm:cxn modelId="{EA25CB40-33C3-4B49-A738-7BE0D7F203CF}" type="presOf" srcId="{D540B663-5BFA-4B74-8F48-CBBFE3B12C9C}" destId="{B284F8D3-E72D-499A-A12F-4C8D7E0CB7FC}" srcOrd="1" destOrd="0" presId="urn:microsoft.com/office/officeart/2008/layout/NameandTitleOrganizationalChart"/>
+    <dgm:cxn modelId="{8B4EA2D3-D32E-41B0-AF9C-11A645385A4D}" type="presOf" srcId="{0BB396F2-BB03-431F-9865-24C774031036}" destId="{868D9EFC-ED5B-4B70-BF12-6B6EE976BC6C}" srcOrd="1" destOrd="0" presId="urn:microsoft.com/office/officeart/2008/layout/NameandTitleOrganizationalChart"/>
+    <dgm:cxn modelId="{398BFCBD-96F7-4F3C-8689-66EFE8312C54}" srcId="{D5E13001-A65A-4CA0-9F51-2D794B55BFF0}" destId="{0F83784A-003A-49DB-ACEA-160D0F0A3911}" srcOrd="1" destOrd="0" parTransId="{4C50C0E3-BAD3-4530-860B-8DAB8C0038B5}" sibTransId="{40BE5631-476B-4840-BD9B-B1013E018B47}"/>
+    <dgm:cxn modelId="{0DEAA453-F9D6-49A4-BC7C-624E8DBD827C}" type="presOf" srcId="{E99A997E-D705-4798-8AE7-844732E114CB}" destId="{84292A0F-DB1A-4F8F-852E-1E17421FB850}" srcOrd="0" destOrd="0" presId="urn:microsoft.com/office/officeart/2008/layout/NameandTitleOrganizationalChart"/>
+    <dgm:cxn modelId="{661FCA5D-0515-4A0A-A499-A1A91FBC33DF}" type="presOf" srcId="{F678BEAC-1303-4084-96E5-8A50F84BB69F}" destId="{BA1D7C01-8C5E-4C5B-BE9E-F3B3186D5F1A}" srcOrd="1" destOrd="0" presId="urn:microsoft.com/office/officeart/2008/layout/NameandTitleOrganizationalChart"/>
+    <dgm:cxn modelId="{03C1A75D-2E6D-4403-9CC4-42C288B1A6A1}" type="presOf" srcId="{0F83784A-003A-49DB-ACEA-160D0F0A3911}" destId="{76BE4655-DFEA-4A37-B0EB-0AC8CA4538C5}" srcOrd="1" destOrd="0" presId="urn:microsoft.com/office/officeart/2008/layout/NameandTitleOrganizationalChart"/>
+    <dgm:cxn modelId="{F013177D-BCE4-4371-931F-1BC10EB1BF79}" type="presOf" srcId="{E8348F28-C65B-4930-BA69-249A70A4C196}" destId="{94149895-433C-416B-9694-FBF0D0AC1F3C}" srcOrd="0" destOrd="0" presId="urn:microsoft.com/office/officeart/2008/layout/NameandTitleOrganizationalChart"/>
+    <dgm:cxn modelId="{F45E2235-661F-42B9-9CE5-04BC89F26F7A}" type="presOf" srcId="{99D56CDD-08C2-4AF2-856C-B309D475BD25}" destId="{CF354CBD-612A-4DE5-8844-5ECC58CF3C45}" srcOrd="1" destOrd="0" presId="urn:microsoft.com/office/officeart/2008/layout/NameandTitleOrganizationalChart"/>
+    <dgm:cxn modelId="{7A77911D-4761-4D4B-BC4E-2E2BD6E92F24}" type="presOf" srcId="{0EF0A87E-140C-46DE-B381-FB5A3DD5CAC1}" destId="{031ADD36-96EC-452E-B6B9-41BAACE3D1B1}" srcOrd="0" destOrd="0" presId="urn:microsoft.com/office/officeart/2008/layout/NameandTitleOrganizationalChart"/>
+    <dgm:cxn modelId="{D0F5B529-8271-4924-BC88-39C20FA91100}" type="presOf" srcId="{434C9BC0-1BBE-4FF7-BA54-7053C9124D5C}" destId="{EC64D269-AC24-47CE-BBC4-F24156E63223}" srcOrd="1" destOrd="0" presId="urn:microsoft.com/office/officeart/2008/layout/NameandTitleOrganizationalChart"/>
+    <dgm:cxn modelId="{1847087C-9EE2-4BED-B2BA-5D7CB6AC8D80}" type="presOf" srcId="{ADADAD12-C16C-4687-B7B6-88A69B299E3A}" destId="{1D6DBE54-1201-45DE-B8D0-C3B3B9F7A860}" srcOrd="0" destOrd="0" presId="urn:microsoft.com/office/officeart/2008/layout/NameandTitleOrganizationalChart"/>
+    <dgm:cxn modelId="{110E6A02-B232-4287-A976-120B6D96957C}" srcId="{56697E52-AADE-4056-B6BE-6F13BD1CF381}" destId="{D540B663-5BFA-4B74-8F48-CBBFE3B12C9C}" srcOrd="1" destOrd="0" parTransId="{8CF85BBB-2E2B-41BC-A2E0-AFFEE7FD5A87}" sibTransId="{A39A2D05-D581-47DA-A62D-CA6E6F472AD5}"/>
+    <dgm:cxn modelId="{225D3F12-DD65-45CF-B48B-A2D300CD3F9A}" type="presOf" srcId="{91EBF273-7B12-451F-95DD-4AF373318C7A}" destId="{72E76C14-CC89-48C7-BA54-AD6B3DC6D4E3}" srcOrd="0" destOrd="0" presId="urn:microsoft.com/office/officeart/2008/layout/NameandTitleOrganizationalChart"/>
+    <dgm:cxn modelId="{07E6F41B-A47D-4DE2-A2D3-F418E0BEBBCE}" srcId="{56697E52-AADE-4056-B6BE-6F13BD1CF381}" destId="{68D7C4E0-2687-4ADE-A8D2-C9F2D001E585}" srcOrd="0" destOrd="0" parTransId="{FFD4D3BD-C01E-427A-A03E-E15EF3C6F762}" sibTransId="{44525E0D-A614-454D-B527-85A9DD18FE1C}"/>
+    <dgm:cxn modelId="{890805CF-F89C-4A24-BB8D-C115159D9CD8}" type="presOf" srcId="{E8F1E285-D583-4DF2-8008-9BA5D823E163}" destId="{7C8A9937-C195-41E7-9318-2B4E8C81A209}" srcOrd="0" destOrd="0" presId="urn:microsoft.com/office/officeart/2008/layout/NameandTitleOrganizationalChart"/>
+    <dgm:cxn modelId="{46AA37B1-D3E4-431E-9087-A5AF3D3E9CE1}" type="presOf" srcId="{68F28304-8602-49C0-BF3D-2CB69A03D841}" destId="{310CA05A-41C9-4E06-A91A-6639E9D64A34}" srcOrd="0" destOrd="0" presId="urn:microsoft.com/office/officeart/2008/layout/NameandTitleOrganizationalChart"/>
+    <dgm:cxn modelId="{2A2C0901-A5BE-433F-9EE5-45F2F934BAED}" type="presOf" srcId="{E752988D-D174-4163-96E9-F5CD78E4D76C}" destId="{314C0B78-8F40-4082-9AF2-CFFA721CAFAA}" srcOrd="0" destOrd="0" presId="urn:microsoft.com/office/officeart/2008/layout/NameandTitleOrganizationalChart"/>
+    <dgm:cxn modelId="{2AE54A83-910A-4CDE-BF0A-57CE3C2D5582}" type="presOf" srcId="{C911AA48-CF7E-4AB2-9D77-E4073345DB11}" destId="{CEFCF6AF-97E1-4CDB-82C1-044CDEA2074D}" srcOrd="0" destOrd="0" presId="urn:microsoft.com/office/officeart/2008/layout/NameandTitleOrganizationalChart"/>
+    <dgm:cxn modelId="{A346B626-0606-4A8E-9694-EAC48C07B617}" type="presOf" srcId="{67626912-B424-4788-8933-B2334F8E0974}" destId="{C0C6B9EB-73DD-47CB-8E02-16D29A39FE99}" srcOrd="0" destOrd="0" presId="urn:microsoft.com/office/officeart/2008/layout/NameandTitleOrganizationalChart"/>
+    <dgm:cxn modelId="{5200FF3B-CD6D-4B2A-9814-183F03A0F6F6}" srcId="{D5E13001-A65A-4CA0-9F51-2D794B55BFF0}" destId="{99D56CDD-08C2-4AF2-856C-B309D475BD25}" srcOrd="0" destOrd="0" parTransId="{199C6D2B-7D47-48B0-844D-C4E8BEFF156E}" sibTransId="{3FAC7DC9-4089-4624-8C87-971830D480D0}"/>
+    <dgm:cxn modelId="{634A0A17-6FB7-4C19-9D36-8E6819030621}" srcId="{F678BEAC-1303-4084-96E5-8A50F84BB69F}" destId="{0E6D62FF-D6C5-4E4D-818B-ED064D51807B}" srcOrd="0" destOrd="0" parTransId="{405DBFD2-51B5-4881-89D2-F3C85B83F2F4}" sibTransId="{92777329-391F-4805-8D66-7FA1269C138F}"/>
+    <dgm:cxn modelId="{89859F60-397E-4877-8A42-25045FB65C2F}" type="presOf" srcId="{0BB396F2-BB03-431F-9865-24C774031036}" destId="{6BF7DE2A-931E-44C7-9DC2-E8E3C0297739}" srcOrd="0" destOrd="0" presId="urn:microsoft.com/office/officeart/2008/layout/NameandTitleOrganizationalChart"/>
+    <dgm:cxn modelId="{6A148F62-66C6-4BD3-9A77-3405C68B990A}" type="presOf" srcId="{405DBFD2-51B5-4881-89D2-F3C85B83F2F4}" destId="{C15B5E30-7154-4502-816C-7A6F7C6F5096}" srcOrd="0" destOrd="0" presId="urn:microsoft.com/office/officeart/2008/layout/NameandTitleOrganizationalChart"/>
+    <dgm:cxn modelId="{9CCCAA5B-DEAB-42F4-B612-748585828AA1}" type="presOf" srcId="{434C9BC0-1BBE-4FF7-BA54-7053C9124D5C}" destId="{D2C50AEE-5D0A-473D-BC99-B89DCB9A2E45}" srcOrd="0" destOrd="0" presId="urn:microsoft.com/office/officeart/2008/layout/NameandTitleOrganizationalChart"/>
     <dgm:cxn modelId="{D1A5CE71-9DB9-4F62-9E9D-EEB52226B840}" type="presOf" srcId="{6A32BDBE-AB56-4C0A-98C4-C919A95C198E}" destId="{055583AB-361C-494F-B08A-062873BA84A8}" srcOrd="0" destOrd="0" presId="urn:microsoft.com/office/officeart/2008/layout/NameandTitleOrganizationalChart"/>
-    <dgm:cxn modelId="{661FCA5D-0515-4A0A-A499-A1A91FBC33DF}" type="presOf" srcId="{F678BEAC-1303-4084-96E5-8A50F84BB69F}" destId="{BA1D7C01-8C5E-4C5B-BE9E-F3B3186D5F1A}" srcOrd="1" destOrd="0" presId="urn:microsoft.com/office/officeart/2008/layout/NameandTitleOrganizationalChart"/>
-    <dgm:cxn modelId="{919EDCF4-E0FC-4635-A3BD-D335A64503EC}" type="presOf" srcId="{9E75A283-CF8B-4FFD-AA4D-13015F3BB96B}" destId="{2AEDA269-CA41-4EF8-8031-92AA2C84432A}" srcOrd="0" destOrd="0" presId="urn:microsoft.com/office/officeart/2008/layout/NameandTitleOrganizationalChart"/>
-    <dgm:cxn modelId="{3A387A26-BF4F-4B79-89A4-961EB75D1DF8}" type="presOf" srcId="{0F83784A-003A-49DB-ACEA-160D0F0A3911}" destId="{0ABB2235-C64D-45A3-86EA-BEE78AAEF0B3}" srcOrd="0" destOrd="0" presId="urn:microsoft.com/office/officeart/2008/layout/NameandTitleOrganizationalChart"/>
-    <dgm:cxn modelId="{01848FEA-8E97-4B36-82B8-D85A4CD8B583}" type="presOf" srcId="{0393F10E-5788-40A1-9256-0CC606F7C6ED}" destId="{BED8F21F-0A46-4808-94F7-78855CC1F6B6}" srcOrd="0" destOrd="0" presId="urn:microsoft.com/office/officeart/2008/layout/NameandTitleOrganizationalChart"/>
-    <dgm:cxn modelId="{C8DDBB12-442C-45F7-8E9E-1FC00DE2BDBD}" type="presOf" srcId="{99D56CDD-08C2-4AF2-856C-B309D475BD25}" destId="{E27A79C4-C916-448A-AC18-927A32232ABB}" srcOrd="0" destOrd="0" presId="urn:microsoft.com/office/officeart/2008/layout/NameandTitleOrganizationalChart"/>
+    <dgm:cxn modelId="{589B4D09-2A3E-4165-BDB6-F5F433B4AC45}" srcId="{68D7C4E0-2687-4ADE-A8D2-C9F2D001E585}" destId="{F678BEAC-1303-4084-96E5-8A50F84BB69F}" srcOrd="0" destOrd="0" parTransId="{7DD156DF-042A-4ED4-941C-18BA714AFE1D}" sibTransId="{ADADAD12-C16C-4687-B7B6-88A69B299E3A}"/>
+    <dgm:cxn modelId="{A5BBAC93-D07E-4B49-BF8B-329CACC03EB5}" type="presOf" srcId="{68D7C4E0-2687-4ADE-A8D2-C9F2D001E585}" destId="{70674121-7958-4D2E-88AF-CF5E50EE46F8}" srcOrd="1" destOrd="0" presId="urn:microsoft.com/office/officeart/2008/layout/NameandTitleOrganizationalChart"/>
     <dgm:cxn modelId="{439DFD96-AB43-48A9-A383-E168BAE4F4F4}" type="presOf" srcId="{56697E52-AADE-4056-B6BE-6F13BD1CF381}" destId="{42FB3674-59FC-4BA7-8A7B-20D0E0BDD762}" srcOrd="1" destOrd="0" presId="urn:microsoft.com/office/officeart/2008/layout/NameandTitleOrganizationalChart"/>
     <dgm:cxn modelId="{AE2DBC00-3CC7-445E-84D3-B2EEA59E0591}" type="presOf" srcId="{4C50C0E3-BAD3-4530-860B-8DAB8C0038B5}" destId="{D8C91A35-1D87-4063-B169-191996446846}" srcOrd="0" destOrd="0" presId="urn:microsoft.com/office/officeart/2008/layout/NameandTitleOrganizationalChart"/>
-    <dgm:cxn modelId="{DB6EF65F-9900-4C5A-B551-458AF5C9950B}" type="presOf" srcId="{D540B663-5BFA-4B74-8F48-CBBFE3B12C9C}" destId="{2CBF305B-8A45-4A22-9451-E4423C449E09}" srcOrd="0" destOrd="0" presId="urn:microsoft.com/office/officeart/2008/layout/NameandTitleOrganizationalChart"/>
-    <dgm:cxn modelId="{46AA37B1-D3E4-431E-9087-A5AF3D3E9CE1}" type="presOf" srcId="{68F28304-8602-49C0-BF3D-2CB69A03D841}" destId="{310CA05A-41C9-4E06-A91A-6639E9D64A34}" srcOrd="0" destOrd="0" presId="urn:microsoft.com/office/officeart/2008/layout/NameandTitleOrganizationalChart"/>
-    <dgm:cxn modelId="{44050953-E79F-4C68-8B80-E99BD5ADBA8D}" type="presOf" srcId="{D9A52C7E-C984-4849-9D7B-94F589399AF3}" destId="{D5B18486-331E-4E15-A115-BA00544F74B3}" srcOrd="0" destOrd="0" presId="urn:microsoft.com/office/officeart/2008/layout/NameandTitleOrganizationalChart"/>
+    <dgm:cxn modelId="{E13C3762-0BA5-4FB3-B1EB-9A73790D83EF}" type="presOf" srcId="{F081E3B7-74CF-4800-A009-8038376748A3}" destId="{E6AF1874-1814-4C87-9325-06813BDAACB5}" srcOrd="0" destOrd="0" presId="urn:microsoft.com/office/officeart/2008/layout/NameandTitleOrganizationalChart"/>
+    <dgm:cxn modelId="{7D261A23-10CC-4C6C-9BCC-EC4D8E4B78AA}" type="presOf" srcId="{0E6D62FF-D6C5-4E4D-818B-ED064D51807B}" destId="{09A07592-F47E-4FF2-8BED-F9B66642AD1C}" srcOrd="0" destOrd="0" presId="urn:microsoft.com/office/officeart/2008/layout/NameandTitleOrganizationalChart"/>
+    <dgm:cxn modelId="{E78E17FD-3024-433C-B241-CDAA36264CBA}" type="presOf" srcId="{539C4B8D-788C-4D1F-9C1A-D6775BD9661F}" destId="{92BD9391-3900-40D1-A22E-5050A21E1E29}" srcOrd="1" destOrd="0" presId="urn:microsoft.com/office/officeart/2008/layout/NameandTitleOrganizationalChart"/>
+    <dgm:cxn modelId="{88E2804B-F164-406F-91A6-9570FA0B7C64}" type="presOf" srcId="{3FAC7DC9-4089-4624-8C87-971830D480D0}" destId="{76A8C720-164B-4F65-BC80-B1CBEFC6064B}" srcOrd="0" destOrd="0" presId="urn:microsoft.com/office/officeart/2008/layout/NameandTitleOrganizationalChart"/>
+    <dgm:cxn modelId="{0D4496E0-8162-40FC-B553-0E218258716E}" type="presOf" srcId="{40BE5631-476B-4840-BD9B-B1013E018B47}" destId="{4ED0B91F-7835-4A9F-A5CE-125F40156687}" srcOrd="0" destOrd="0" presId="urn:microsoft.com/office/officeart/2008/layout/NameandTitleOrganizationalChart"/>
+    <dgm:cxn modelId="{C8DDBB12-442C-45F7-8E9E-1FC00DE2BDBD}" type="presOf" srcId="{99D56CDD-08C2-4AF2-856C-B309D475BD25}" destId="{E27A79C4-C916-448A-AC18-927A32232ABB}" srcOrd="0" destOrd="0" presId="urn:microsoft.com/office/officeart/2008/layout/NameandTitleOrganizationalChart"/>
+    <dgm:cxn modelId="{80A6F0A7-7CBD-4CEB-99DF-42A5A517A01F}" srcId="{89F2759A-4735-4ADB-A3EE-43CBC490F477}" destId="{56697E52-AADE-4056-B6BE-6F13BD1CF381}" srcOrd="0" destOrd="0" parTransId="{1325CF2E-69A0-409D-B04B-D6AA99D69035}" sibTransId="{D9A52C7E-C984-4849-9D7B-94F589399AF3}"/>
+    <dgm:cxn modelId="{F200D331-BACB-46DD-B1D3-39B64CAEFD3F}" type="presOf" srcId="{F081E3B7-74CF-4800-A009-8038376748A3}" destId="{81CE642A-3ED9-4D0A-BC48-11E1E33522F5}" srcOrd="1" destOrd="0" presId="urn:microsoft.com/office/officeart/2008/layout/NameandTitleOrganizationalChart"/>
+    <dgm:cxn modelId="{7D39D2F0-D331-4B9A-B263-29CA341498D3}" type="presOf" srcId="{FFD4D3BD-C01E-427A-A03E-E15EF3C6F762}" destId="{40BCE0C3-DD38-41FF-9B2D-133F9C1069E0}" srcOrd="0" destOrd="0" presId="urn:microsoft.com/office/officeart/2008/layout/NameandTitleOrganizationalChart"/>
+    <dgm:cxn modelId="{44CB88A0-488A-4C44-AB12-D2C4C79CBD08}" type="presOf" srcId="{462CBFA3-11F4-48FD-9665-AB36A6C7BB52}" destId="{313C16C7-870E-47C6-94C8-743D20450E98}" srcOrd="0" destOrd="0" presId="urn:microsoft.com/office/officeart/2008/layout/NameandTitleOrganizationalChart"/>
+    <dgm:cxn modelId="{9A706EE7-D8E8-4814-82FE-0D7A947353DE}" type="presOf" srcId="{78339D57-EFCF-48CF-A9D3-9D5AD1A9B16A}" destId="{95E5A462-1403-4A76-BC09-DB8813D4E1C3}" srcOrd="0" destOrd="0" presId="urn:microsoft.com/office/officeart/2008/layout/NameandTitleOrganizationalChart"/>
+    <dgm:cxn modelId="{0614EFBE-1AF9-4F10-A2E3-0B1D45B5013B}" type="presOf" srcId="{56697E52-AADE-4056-B6BE-6F13BD1CF381}" destId="{7CA9E5A9-0401-40F3-8070-7B576D0F4A45}" srcOrd="0" destOrd="0" presId="urn:microsoft.com/office/officeart/2008/layout/NameandTitleOrganizationalChart"/>
+    <dgm:cxn modelId="{102A4FA4-09A9-4CF8-9CC7-BF3656C7C796}" srcId="{70643935-346A-496B-8A78-8A02F32C0F1E}" destId="{594DF703-F6F6-47A8-AAAA-D2D1B44F85D2}" srcOrd="0" destOrd="0" parTransId="{462CBFA3-11F4-48FD-9665-AB36A6C7BB52}" sibTransId="{9E75A283-CF8B-4FFD-AA4D-13015F3BB96B}"/>
+    <dgm:cxn modelId="{DD97EB04-BFFD-40B8-82C9-F6931D8A48CD}" type="presOf" srcId="{2B5FE461-88C1-4D18-AE4C-F63D1E6AD74F}" destId="{567B6576-E619-4516-B320-56093EA9B377}" srcOrd="1" destOrd="0" presId="urn:microsoft.com/office/officeart/2008/layout/NameandTitleOrganizationalChart"/>
+    <dgm:cxn modelId="{0C19B06F-5A31-4EF8-AF17-5D01411CEC8B}" srcId="{D5E13001-A65A-4CA0-9F51-2D794B55BFF0}" destId="{0EF0A87E-140C-46DE-B381-FB5A3DD5CAC1}" srcOrd="2" destOrd="0" parTransId="{5144D60B-48D6-4068-A88B-E80088D42192}" sibTransId="{0393F10E-5788-40A1-9256-0CC606F7C6ED}"/>
+    <dgm:cxn modelId="{413815CD-2514-4119-B12F-0081FC88E969}" type="presOf" srcId="{D5E13001-A65A-4CA0-9F51-2D794B55BFF0}" destId="{4D78201E-0FC5-402D-9174-4AA604F9EBD1}" srcOrd="1" destOrd="0" presId="urn:microsoft.com/office/officeart/2008/layout/NameandTitleOrganizationalChart"/>
     <dgm:cxn modelId="{1DCF2606-E0C2-4D6A-A70C-61DC6BCCC2AC}" type="presOf" srcId="{19B9AF33-E84B-4777-B927-6E0916B2F89D}" destId="{03CA9C2F-41CA-4FD0-A92D-69A6DF5FB5F7}" srcOrd="0" destOrd="0" presId="urn:microsoft.com/office/officeart/2008/layout/NameandTitleOrganizationalChart"/>
-    <dgm:cxn modelId="{E4538C48-3471-494E-AE4E-F848DE39164A}" srcId="{D540B663-5BFA-4B74-8F48-CBBFE3B12C9C}" destId="{70643935-346A-496B-8A78-8A02F32C0F1E}" srcOrd="0" destOrd="0" parTransId="{6670EC82-986C-4C13-8499-BFFD1E533534}" sibTransId="{91EBF273-7B12-451F-95DD-4AF373318C7A}"/>
-    <dgm:cxn modelId="{634A0A17-6FB7-4C19-9D36-8E6819030621}" srcId="{F678BEAC-1303-4084-96E5-8A50F84BB69F}" destId="{0E6D62FF-D6C5-4E4D-818B-ED064D51807B}" srcOrd="0" destOrd="0" parTransId="{405DBFD2-51B5-4881-89D2-F3C85B83F2F4}" sibTransId="{92777329-391F-4805-8D66-7FA1269C138F}"/>
-    <dgm:cxn modelId="{E13C3762-0BA5-4FB3-B1EB-9A73790D83EF}" type="presOf" srcId="{F081E3B7-74CF-4800-A009-8038376748A3}" destId="{E6AF1874-1814-4C87-9325-06813BDAACB5}" srcOrd="0" destOrd="0" presId="urn:microsoft.com/office/officeart/2008/layout/NameandTitleOrganizationalChart"/>
-    <dgm:cxn modelId="{2A2C0901-A5BE-433F-9EE5-45F2F934BAED}" type="presOf" srcId="{E752988D-D174-4163-96E9-F5CD78E4D76C}" destId="{314C0B78-8F40-4082-9AF2-CFFA721CAFAA}" srcOrd="0" destOrd="0" presId="urn:microsoft.com/office/officeart/2008/layout/NameandTitleOrganizationalChart"/>
-    <dgm:cxn modelId="{9A706EE7-D8E8-4814-82FE-0D7A947353DE}" type="presOf" srcId="{78339D57-EFCF-48CF-A9D3-9D5AD1A9B16A}" destId="{95E5A462-1403-4A76-BC09-DB8813D4E1C3}" srcOrd="0" destOrd="0" presId="urn:microsoft.com/office/officeart/2008/layout/NameandTitleOrganizationalChart"/>
-    <dgm:cxn modelId="{8C1D3F1A-EC60-4376-8010-82B1D06E6F5C}" srcId="{594DF703-F6F6-47A8-AAAA-D2D1B44F85D2}" destId="{F081E3B7-74CF-4800-A009-8038376748A3}" srcOrd="0" destOrd="0" parTransId="{67626912-B424-4788-8933-B2334F8E0974}" sibTransId="{76C0F7E7-26F0-403A-9C95-304BEE7CBE6E}"/>
-    <dgm:cxn modelId="{9E87A104-3207-4032-B42D-70E240EE9027}" type="presOf" srcId="{68D7C4E0-2687-4ADE-A8D2-C9F2D001E585}" destId="{31526FA4-0910-4501-80BE-BC5814B05CD0}" srcOrd="0" destOrd="0" presId="urn:microsoft.com/office/officeart/2008/layout/NameandTitleOrganizationalChart"/>
-    <dgm:cxn modelId="{7D261A23-10CC-4C6C-9BCC-EC4D8E4B78AA}" type="presOf" srcId="{0E6D62FF-D6C5-4E4D-818B-ED064D51807B}" destId="{09A07592-F47E-4FF2-8BED-F9B66642AD1C}" srcOrd="0" destOrd="0" presId="urn:microsoft.com/office/officeart/2008/layout/NameandTitleOrganizationalChart"/>
-    <dgm:cxn modelId="{7A77911D-4761-4D4B-BC4E-2E2BD6E92F24}" type="presOf" srcId="{0EF0A87E-140C-46DE-B381-FB5A3DD5CAC1}" destId="{031ADD36-96EC-452E-B6B9-41BAACE3D1B1}" srcOrd="0" destOrd="0" presId="urn:microsoft.com/office/officeart/2008/layout/NameandTitleOrganizationalChart"/>
-    <dgm:cxn modelId="{F013177D-BCE4-4371-931F-1BC10EB1BF79}" type="presOf" srcId="{E8348F28-C65B-4930-BA69-249A70A4C196}" destId="{94149895-433C-416B-9694-FBF0D0AC1F3C}" srcOrd="0" destOrd="0" presId="urn:microsoft.com/office/officeart/2008/layout/NameandTitleOrganizationalChart"/>
-    <dgm:cxn modelId="{C1F411AC-7419-4EE7-9AE3-9B66E8185FEF}" type="presOf" srcId="{B90755AD-2F18-4178-83EB-A2120718733B}" destId="{9F7CA0FC-75A3-4EA9-A3DF-E61A1FE159BC}" srcOrd="0" destOrd="0" presId="urn:microsoft.com/office/officeart/2008/layout/NameandTitleOrganizationalChart"/>
-    <dgm:cxn modelId="{0C19B06F-5A31-4EF8-AF17-5D01411CEC8B}" srcId="{D5E13001-A65A-4CA0-9F51-2D794B55BFF0}" destId="{0EF0A87E-140C-46DE-B381-FB5A3DD5CAC1}" srcOrd="2" destOrd="0" parTransId="{5144D60B-48D6-4068-A88B-E80088D42192}" sibTransId="{0393F10E-5788-40A1-9256-0CC606F7C6ED}"/>
-    <dgm:cxn modelId="{110E6A02-B232-4287-A976-120B6D96957C}" srcId="{56697E52-AADE-4056-B6BE-6F13BD1CF381}" destId="{D540B663-5BFA-4B74-8F48-CBBFE3B12C9C}" srcOrd="1" destOrd="0" parTransId="{8CF85BBB-2E2B-41BC-A2E0-AFFEE7FD5A87}" sibTransId="{A39A2D05-D581-47DA-A62D-CA6E6F472AD5}"/>
-    <dgm:cxn modelId="{7D39D2F0-D331-4B9A-B263-29CA341498D3}" type="presOf" srcId="{FFD4D3BD-C01E-427A-A03E-E15EF3C6F762}" destId="{40BCE0C3-DD38-41FF-9B2D-133F9C1069E0}" srcOrd="0" destOrd="0" presId="urn:microsoft.com/office/officeart/2008/layout/NameandTitleOrganizationalChart"/>
-    <dgm:cxn modelId="{DCA2EFDA-9760-4433-9C12-8359667A6BD8}" type="presOf" srcId="{70643935-346A-496B-8A78-8A02F32C0F1E}" destId="{69A071B1-3CEF-4CDC-A4A4-8A0326963EC5}" srcOrd="0" destOrd="0" presId="urn:microsoft.com/office/officeart/2008/layout/NameandTitleOrganizationalChart"/>
-    <dgm:cxn modelId="{2AE54A83-910A-4CDE-BF0A-57CE3C2D5582}" type="presOf" srcId="{C911AA48-CF7E-4AB2-9D77-E4073345DB11}" destId="{CEFCF6AF-97E1-4CDB-82C1-044CDEA2074D}" srcOrd="0" destOrd="0" presId="urn:microsoft.com/office/officeart/2008/layout/NameandTitleOrganizationalChart"/>
     <dgm:cxn modelId="{8103EFAC-6CF8-4A29-9E9F-36374829069A}" type="presOf" srcId="{8CF85BBB-2E2B-41BC-A2E0-AFFEE7FD5A87}" destId="{FEA330ED-9A4F-421D-AB06-89F45CBB56A4}" srcOrd="0" destOrd="0" presId="urn:microsoft.com/office/officeart/2008/layout/NameandTitleOrganizationalChart"/>
-    <dgm:cxn modelId="{8EA736FE-8C17-45E1-ACF7-DBF72F0C358D}" type="presOf" srcId="{5144D60B-48D6-4068-A88B-E80088D42192}" destId="{C12FA5AC-F7A5-443A-9EF7-FE4FC8CC2584}" srcOrd="0" destOrd="0" presId="urn:microsoft.com/office/officeart/2008/layout/NameandTitleOrganizationalChart"/>
-    <dgm:cxn modelId="{398BFCBD-96F7-4F3C-8689-66EFE8312C54}" srcId="{D5E13001-A65A-4CA0-9F51-2D794B55BFF0}" destId="{0F83784A-003A-49DB-ACEA-160D0F0A3911}" srcOrd="1" destOrd="0" parTransId="{4C50C0E3-BAD3-4530-860B-8DAB8C0038B5}" sibTransId="{40BE5631-476B-4840-BD9B-B1013E018B47}"/>
-    <dgm:cxn modelId="{A5BBAC93-D07E-4B49-BF8B-329CACC03EB5}" type="presOf" srcId="{68D7C4E0-2687-4ADE-A8D2-C9F2D001E585}" destId="{70674121-7958-4D2E-88AF-CF5E50EE46F8}" srcOrd="1" destOrd="0" presId="urn:microsoft.com/office/officeart/2008/layout/NameandTitleOrganizationalChart"/>
-    <dgm:cxn modelId="{F79C439A-56D9-4D22-846E-851F10E2D810}" srcId="{70643935-346A-496B-8A78-8A02F32C0F1E}" destId="{434C9BC0-1BBE-4FF7-BA54-7053C9124D5C}" srcOrd="2" destOrd="0" parTransId="{E8F1E285-D583-4DF2-8008-9BA5D823E163}" sibTransId="{E99A997E-D705-4798-8AE7-844732E114CB}"/>
-    <dgm:cxn modelId="{589B4D09-2A3E-4165-BDB6-F5F433B4AC45}" srcId="{68D7C4E0-2687-4ADE-A8D2-C9F2D001E585}" destId="{F678BEAC-1303-4084-96E5-8A50F84BB69F}" srcOrd="0" destOrd="0" parTransId="{7DD156DF-042A-4ED4-941C-18BA714AFE1D}" sibTransId="{ADADAD12-C16C-4687-B7B6-88A69B299E3A}"/>
-    <dgm:cxn modelId="{80A6F0A7-7CBD-4CEB-99DF-42A5A517A01F}" srcId="{89F2759A-4735-4ADB-A3EE-43CBC490F477}" destId="{56697E52-AADE-4056-B6BE-6F13BD1CF381}" srcOrd="0" destOrd="0" parTransId="{1325CF2E-69A0-409D-B04B-D6AA99D69035}" sibTransId="{D9A52C7E-C984-4849-9D7B-94F589399AF3}"/>
-    <dgm:cxn modelId="{18E03B67-FBC2-496F-A369-62C8DB9A53A5}" type="presOf" srcId="{2B5FE461-88C1-4D18-AE4C-F63D1E6AD74F}" destId="{2450682B-9C32-4254-A511-FC81F1905EA1}" srcOrd="0" destOrd="0" presId="urn:microsoft.com/office/officeart/2008/layout/NameandTitleOrganizationalChart"/>
-    <dgm:cxn modelId="{88E2804B-F164-406F-91A6-9570FA0B7C64}" type="presOf" srcId="{3FAC7DC9-4089-4624-8C87-971830D480D0}" destId="{76A8C720-164B-4F65-BC80-B1CBEFC6064B}" srcOrd="0" destOrd="0" presId="urn:microsoft.com/office/officeart/2008/layout/NameandTitleOrganizationalChart"/>
-    <dgm:cxn modelId="{2D83F753-8B53-4F97-8CA8-5F2403419C20}" type="presOf" srcId="{F678BEAC-1303-4084-96E5-8A50F84BB69F}" destId="{7399316D-1F4E-4902-991A-7751ED03ADCC}" srcOrd="0" destOrd="0" presId="urn:microsoft.com/office/officeart/2008/layout/NameandTitleOrganizationalChart"/>
-    <dgm:cxn modelId="{03C1A75D-2E6D-4403-9CC4-42C288B1A6A1}" type="presOf" srcId="{0F83784A-003A-49DB-ACEA-160D0F0A3911}" destId="{76BE4655-DFEA-4A37-B0EB-0AC8CA4538C5}" srcOrd="1" destOrd="0" presId="urn:microsoft.com/office/officeart/2008/layout/NameandTitleOrganizationalChart"/>
-    <dgm:cxn modelId="{1847087C-9EE2-4BED-B2BA-5D7CB6AC8D80}" type="presOf" srcId="{ADADAD12-C16C-4687-B7B6-88A69B299E3A}" destId="{1D6DBE54-1201-45DE-B8D0-C3B3B9F7A860}" srcOrd="0" destOrd="0" presId="urn:microsoft.com/office/officeart/2008/layout/NameandTitleOrganizationalChart"/>
-    <dgm:cxn modelId="{9CCCAA5B-DEAB-42F4-B612-748585828AA1}" type="presOf" srcId="{434C9BC0-1BBE-4FF7-BA54-7053C9124D5C}" destId="{D2C50AEE-5D0A-473D-BC99-B89DCB9A2E45}" srcOrd="0" destOrd="0" presId="urn:microsoft.com/office/officeart/2008/layout/NameandTitleOrganizationalChart"/>
-    <dgm:cxn modelId="{890805CF-F89C-4A24-BB8D-C115159D9CD8}" type="presOf" srcId="{E8F1E285-D583-4DF2-8008-9BA5D823E163}" destId="{7C8A9937-C195-41E7-9318-2B4E8C81A209}" srcOrd="0" destOrd="0" presId="urn:microsoft.com/office/officeart/2008/layout/NameandTitleOrganizationalChart"/>
-    <dgm:cxn modelId="{5200FF3B-CD6D-4B2A-9814-183F03A0F6F6}" srcId="{D5E13001-A65A-4CA0-9F51-2D794B55BFF0}" destId="{99D56CDD-08C2-4AF2-856C-B309D475BD25}" srcOrd="0" destOrd="0" parTransId="{199C6D2B-7D47-48B0-844D-C4E8BEFF156E}" sibTransId="{3FAC7DC9-4089-4624-8C87-971830D480D0}"/>
-    <dgm:cxn modelId="{0614EFBE-1AF9-4F10-A2E3-0B1D45B5013B}" type="presOf" srcId="{56697E52-AADE-4056-B6BE-6F13BD1CF381}" destId="{7CA9E5A9-0401-40F3-8070-7B576D0F4A45}" srcOrd="0" destOrd="0" presId="urn:microsoft.com/office/officeart/2008/layout/NameandTitleOrganizationalChart"/>
-    <dgm:cxn modelId="{4AD93C13-A73B-462C-AD1A-82DCB8F88E32}" type="presOf" srcId="{199C6D2B-7D47-48B0-844D-C4E8BEFF156E}" destId="{A6F9C548-BF31-4D46-883F-B92582EA519B}" srcOrd="0" destOrd="0" presId="urn:microsoft.com/office/officeart/2008/layout/NameandTitleOrganizationalChart"/>
-    <dgm:cxn modelId="{0A81A221-6D97-4FA6-BF79-4AD2E79C8F08}" srcId="{70643935-346A-496B-8A78-8A02F32C0F1E}" destId="{539C4B8D-788C-4D1F-9C1A-D6775BD9661F}" srcOrd="1" destOrd="0" parTransId="{6A32BDBE-AB56-4C0A-98C4-C919A95C198E}" sibTransId="{C911AA48-CF7E-4AB2-9D77-E4073345DB11}"/>
-    <dgm:cxn modelId="{B7DEBB6E-63DA-4551-B53A-9CD609A9A800}" type="presOf" srcId="{5BDFD8CD-9F2E-4679-9ABC-8CD62E22807D}" destId="{5A758C1E-8F6C-40C5-BEDF-EABDD004DD51}" srcOrd="0" destOrd="0" presId="urn:microsoft.com/office/officeart/2008/layout/NameandTitleOrganizationalChart"/>
-    <dgm:cxn modelId="{D0F5B529-8271-4924-BC88-39C20FA91100}" type="presOf" srcId="{434C9BC0-1BBE-4FF7-BA54-7053C9124D5C}" destId="{EC64D269-AC24-47CE-BBC4-F24156E63223}" srcOrd="1" destOrd="0" presId="urn:microsoft.com/office/officeart/2008/layout/NameandTitleOrganizationalChart"/>
-    <dgm:cxn modelId="{F200D331-BACB-46DD-B1D3-39B64CAEFD3F}" type="presOf" srcId="{F081E3B7-74CF-4800-A009-8038376748A3}" destId="{81CE642A-3ED9-4D0A-BC48-11E1E33522F5}" srcOrd="1" destOrd="0" presId="urn:microsoft.com/office/officeart/2008/layout/NameandTitleOrganizationalChart"/>
-    <dgm:cxn modelId="{0D4496E0-8162-40FC-B553-0E218258716E}" type="presOf" srcId="{40BE5631-476B-4840-BD9B-B1013E018B47}" destId="{4ED0B91F-7835-4A9F-A5CE-125F40156687}" srcOrd="0" destOrd="0" presId="urn:microsoft.com/office/officeart/2008/layout/NameandTitleOrganizationalChart"/>
-    <dgm:cxn modelId="{413815CD-2514-4119-B12F-0081FC88E969}" type="presOf" srcId="{D5E13001-A65A-4CA0-9F51-2D794B55BFF0}" destId="{4D78201E-0FC5-402D-9174-4AA604F9EBD1}" srcOrd="1" destOrd="0" presId="urn:microsoft.com/office/officeart/2008/layout/NameandTitleOrganizationalChart"/>
-    <dgm:cxn modelId="{16CDBA14-C241-4CB0-A7BA-7A0767AF80F5}" srcId="{F678BEAC-1303-4084-96E5-8A50F84BB69F}" destId="{0BB396F2-BB03-431F-9865-24C774031036}" srcOrd="1" destOrd="0" parTransId="{E8348F28-C65B-4930-BA69-249A70A4C196}" sibTransId="{5BDFD8CD-9F2E-4679-9ABC-8CD62E22807D}"/>
-    <dgm:cxn modelId="{C19A676C-E819-461E-A42C-4746428E7759}" srcId="{56697E52-AADE-4056-B6BE-6F13BD1CF381}" destId="{2B5FE461-88C1-4D18-AE4C-F63D1E6AD74F}" srcOrd="2" destOrd="0" parTransId="{B90755AD-2F18-4178-83EB-A2120718733B}" sibTransId="{19B9AF33-E84B-4777-B927-6E0916B2F89D}"/>
-    <dgm:cxn modelId="{4710166D-C3E9-4346-A34D-D456D681A4D1}" type="presOf" srcId="{0E6D62FF-D6C5-4E4D-818B-ED064D51807B}" destId="{64095247-A6D7-4298-8E35-83EF8550AFBF}" srcOrd="1" destOrd="0" presId="urn:microsoft.com/office/officeart/2008/layout/NameandTitleOrganizationalChart"/>
-    <dgm:cxn modelId="{6AE73098-26CB-4F52-9B61-102F15DCDF40}" type="presOf" srcId="{92777329-391F-4805-8D66-7FA1269C138F}" destId="{CF11A092-9A20-43D1-A9C2-2D26C83ACADE}" srcOrd="0" destOrd="0" presId="urn:microsoft.com/office/officeart/2008/layout/NameandTitleOrganizationalChart"/>
-    <dgm:cxn modelId="{B6CC2A01-D7C5-4E00-8CCC-C08A65C1045F}" type="presOf" srcId="{0EF0A87E-140C-46DE-B381-FB5A3DD5CAC1}" destId="{51424633-ED11-4939-8F22-44BE1CF0C667}" srcOrd="1" destOrd="0" presId="urn:microsoft.com/office/officeart/2008/layout/NameandTitleOrganizationalChart"/>
-    <dgm:cxn modelId="{A346B626-0606-4A8E-9694-EAC48C07B617}" type="presOf" srcId="{67626912-B424-4788-8933-B2334F8E0974}" destId="{C0C6B9EB-73DD-47CB-8E02-16D29A39FE99}" srcOrd="0" destOrd="0" presId="urn:microsoft.com/office/officeart/2008/layout/NameandTitleOrganizationalChart"/>
+    <dgm:cxn modelId="{E786B16F-F52A-49DD-9C83-9F47E3461F8A}" type="presOf" srcId="{A39A2D05-D581-47DA-A62D-CA6E6F472AD5}" destId="{A639E0FE-6548-4948-A17A-C1C18040DF6E}" srcOrd="0" destOrd="0" presId="urn:microsoft.com/office/officeart/2008/layout/NameandTitleOrganizationalChart"/>
     <dgm:cxn modelId="{E6FB4D83-8988-453E-85B1-5975A0E3633F}" type="presOf" srcId="{B40106DC-A9DC-42BC-904B-C31EB1EA33B6}" destId="{54850999-2E8B-4D24-ACD5-19B117ECAC2A}" srcOrd="1" destOrd="0" presId="urn:microsoft.com/office/officeart/2008/layout/NameandTitleOrganizationalChart"/>
-    <dgm:cxn modelId="{8B4EA2D3-D32E-41B0-AF9C-11A645385A4D}" type="presOf" srcId="{0BB396F2-BB03-431F-9865-24C774031036}" destId="{868D9EFC-ED5B-4B70-BF12-6B6EE976BC6C}" srcOrd="1" destOrd="0" presId="urn:microsoft.com/office/officeart/2008/layout/NameandTitleOrganizationalChart"/>
-    <dgm:cxn modelId="{F8FE9ABD-9D8D-4FDA-9DA5-E7098E8D948E}" type="presOf" srcId="{539C4B8D-788C-4D1F-9C1A-D6775BD9661F}" destId="{D7E13116-220B-4069-9DBE-A8FC34928E71}" srcOrd="0" destOrd="0" presId="urn:microsoft.com/office/officeart/2008/layout/NameandTitleOrganizationalChart"/>
-    <dgm:cxn modelId="{472B57DB-57C3-4CFB-BB2E-F75668A930F1}" srcId="{2B5FE461-88C1-4D18-AE4C-F63D1E6AD74F}" destId="{D5E13001-A65A-4CA0-9F51-2D794B55BFF0}" srcOrd="0" destOrd="0" parTransId="{E752988D-D174-4163-96E9-F5CD78E4D76C}" sibTransId="{68F28304-8602-49C0-BF3D-2CB69A03D841}"/>
-    <dgm:cxn modelId="{14FB0B4A-6078-4CB7-A731-6657E7AE7028}" type="presOf" srcId="{76C0F7E7-26F0-403A-9C95-304BEE7CBE6E}" destId="{9BBFDBAF-7660-4F21-B8E1-320DD674465D}" srcOrd="0" destOrd="0" presId="urn:microsoft.com/office/officeart/2008/layout/NameandTitleOrganizationalChart"/>
-    <dgm:cxn modelId="{44CB88A0-488A-4C44-AB12-D2C4C79CBD08}" type="presOf" srcId="{462CBFA3-11F4-48FD-9665-AB36A6C7BB52}" destId="{313C16C7-870E-47C6-94C8-743D20450E98}" srcOrd="0" destOrd="0" presId="urn:microsoft.com/office/officeart/2008/layout/NameandTitleOrganizationalChart"/>
-    <dgm:cxn modelId="{BCB43F46-AE77-405A-A960-86FD11F662B5}" type="presOf" srcId="{594DF703-F6F6-47A8-AAAA-D2D1B44F85D2}" destId="{9526CB03-3BAB-4CFF-A6E3-515CA67413A2}" srcOrd="0" destOrd="0" presId="urn:microsoft.com/office/officeart/2008/layout/NameandTitleOrganizationalChart"/>
-    <dgm:cxn modelId="{07E6F41B-A47D-4DE2-A2D3-F418E0BEBBCE}" srcId="{56697E52-AADE-4056-B6BE-6F13BD1CF381}" destId="{68D7C4E0-2687-4ADE-A8D2-C9F2D001E585}" srcOrd="0" destOrd="0" parTransId="{FFD4D3BD-C01E-427A-A03E-E15EF3C6F762}" sibTransId="{44525E0D-A614-454D-B527-85A9DD18FE1C}"/>
-    <dgm:cxn modelId="{6AE762D2-635C-4159-8930-8858611C9C04}" type="presOf" srcId="{6670EC82-986C-4C13-8499-BFFD1E533534}" destId="{C94229A2-5703-45BE-9E2A-0374FA6FD0B0}" srcOrd="0" destOrd="0" presId="urn:microsoft.com/office/officeart/2008/layout/NameandTitleOrganizationalChart"/>
-    <dgm:cxn modelId="{EA25CB40-33C3-4B49-A738-7BE0D7F203CF}" type="presOf" srcId="{D540B663-5BFA-4B74-8F48-CBBFE3B12C9C}" destId="{B284F8D3-E72D-499A-A12F-4C8D7E0CB7FC}" srcOrd="1" destOrd="0" presId="urn:microsoft.com/office/officeart/2008/layout/NameandTitleOrganizationalChart"/>
-    <dgm:cxn modelId="{F45E2235-661F-42B9-9CE5-04BC89F26F7A}" type="presOf" srcId="{99D56CDD-08C2-4AF2-856C-B309D475BD25}" destId="{CF354CBD-612A-4DE5-8844-5ECC58CF3C45}" srcOrd="1" destOrd="0" presId="urn:microsoft.com/office/officeart/2008/layout/NameandTitleOrganizationalChart"/>
-    <dgm:cxn modelId="{E78E17FD-3024-433C-B241-CDAA36264CBA}" type="presOf" srcId="{539C4B8D-788C-4D1F-9C1A-D6775BD9661F}" destId="{92BD9391-3900-40D1-A22E-5050A21E1E29}" srcOrd="1" destOrd="0" presId="urn:microsoft.com/office/officeart/2008/layout/NameandTitleOrganizationalChart"/>
+    <dgm:cxn modelId="{6B4B0857-90E7-45C5-8815-C726EE3A192E}" srcId="{F678BEAC-1303-4084-96E5-8A50F84BB69F}" destId="{B40106DC-A9DC-42BC-904B-C31EB1EA33B6}" srcOrd="2" destOrd="0" parTransId="{6ED14776-0D34-40E4-9164-D57DE6E82AA3}" sibTransId="{78339D57-EFCF-48CF-A9D3-9D5AD1A9B16A}"/>
     <dgm:cxn modelId="{805F7127-CD73-4587-BEE5-4C4687699BC7}" type="presOf" srcId="{89F2759A-4735-4ADB-A3EE-43CBC490F477}" destId="{70B3DFA5-88A3-477C-922A-CFEA818C8F70}" srcOrd="0" destOrd="0" presId="urn:microsoft.com/office/officeart/2008/layout/NameandTitleOrganizationalChart"/>
-    <dgm:cxn modelId="{D9D6DCEB-98F3-4117-9087-ADBFD6EC7A1D}" type="presOf" srcId="{70643935-346A-496B-8A78-8A02F32C0F1E}" destId="{E141C824-9CAC-4476-B8A9-65519E38AE46}" srcOrd="1" destOrd="0" presId="urn:microsoft.com/office/officeart/2008/layout/NameandTitleOrganizationalChart"/>
-    <dgm:cxn modelId="{DD97EB04-BFFD-40B8-82C9-F6931D8A48CD}" type="presOf" srcId="{2B5FE461-88C1-4D18-AE4C-F63D1E6AD74F}" destId="{567B6576-E619-4516-B320-56093EA9B377}" srcOrd="1" destOrd="0" presId="urn:microsoft.com/office/officeart/2008/layout/NameandTitleOrganizationalChart"/>
-    <dgm:cxn modelId="{E786B16F-F52A-49DD-9C83-9F47E3461F8A}" type="presOf" srcId="{A39A2D05-D581-47DA-A62D-CA6E6F472AD5}" destId="{A639E0FE-6548-4948-A17A-C1C18040DF6E}" srcOrd="0" destOrd="0" presId="urn:microsoft.com/office/officeart/2008/layout/NameandTitleOrganizationalChart"/>
-    <dgm:cxn modelId="{7B3F50B3-C083-43E8-B738-DA5B61E0CEB9}" type="presOf" srcId="{6ED14776-0D34-40E4-9164-D57DE6E82AA3}" destId="{87ED3F99-82E6-4BB3-B93E-4874663EAD4A}" srcOrd="0" destOrd="0" presId="urn:microsoft.com/office/officeart/2008/layout/NameandTitleOrganizationalChart"/>
-    <dgm:cxn modelId="{6A148F62-66C6-4BD3-9A77-3405C68B990A}" type="presOf" srcId="{405DBFD2-51B5-4881-89D2-F3C85B83F2F4}" destId="{C15B5E30-7154-4502-816C-7A6F7C6F5096}" srcOrd="0" destOrd="0" presId="urn:microsoft.com/office/officeart/2008/layout/NameandTitleOrganizationalChart"/>
-    <dgm:cxn modelId="{C9AC642E-C416-425F-AD70-2AC1E56001F7}" type="presOf" srcId="{594DF703-F6F6-47A8-AAAA-D2D1B44F85D2}" destId="{3BCEE51B-ECE3-40B9-AB13-414DDCDFBAEC}" srcOrd="1" destOrd="0" presId="urn:microsoft.com/office/officeart/2008/layout/NameandTitleOrganizationalChart"/>
-    <dgm:cxn modelId="{225D3F12-DD65-45CF-B48B-A2D300CD3F9A}" type="presOf" srcId="{91EBF273-7B12-451F-95DD-4AF373318C7A}" destId="{72E76C14-CC89-48C7-BA54-AD6B3DC6D4E3}" srcOrd="0" destOrd="0" presId="urn:microsoft.com/office/officeart/2008/layout/NameandTitleOrganizationalChart"/>
-    <dgm:cxn modelId="{6B4B0857-90E7-45C5-8815-C726EE3A192E}" srcId="{F678BEAC-1303-4084-96E5-8A50F84BB69F}" destId="{B40106DC-A9DC-42BC-904B-C31EB1EA33B6}" srcOrd="2" destOrd="0" parTransId="{6ED14776-0D34-40E4-9164-D57DE6E82AA3}" sibTransId="{78339D57-EFCF-48CF-A9D3-9D5AD1A9B16A}"/>
-    <dgm:cxn modelId="{D58BFEAD-A1F0-4618-8D11-09E43D0A6827}" type="presOf" srcId="{7DD156DF-042A-4ED4-941C-18BA714AFE1D}" destId="{19B64637-948F-499E-9226-402FDF1919EC}" srcOrd="0" destOrd="0" presId="urn:microsoft.com/office/officeart/2008/layout/NameandTitleOrganizationalChart"/>
-    <dgm:cxn modelId="{102A4FA4-09A9-4CF8-9CC7-BF3656C7C796}" srcId="{70643935-346A-496B-8A78-8A02F32C0F1E}" destId="{594DF703-F6F6-47A8-AAAA-D2D1B44F85D2}" srcOrd="0" destOrd="0" parTransId="{462CBFA3-11F4-48FD-9665-AB36A6C7BB52}" sibTransId="{9E75A283-CF8B-4FFD-AA4D-13015F3BB96B}"/>
-    <dgm:cxn modelId="{F37EF844-4B0A-44C1-9C0F-A7D6D48252C3}" type="presOf" srcId="{D5E13001-A65A-4CA0-9F51-2D794B55BFF0}" destId="{69A7C693-CDE9-4A8C-8FE8-0ED95030A74C}" srcOrd="0" destOrd="0" presId="urn:microsoft.com/office/officeart/2008/layout/NameandTitleOrganizationalChart"/>
-    <dgm:cxn modelId="{89859F60-397E-4877-8A42-25045FB65C2F}" type="presOf" srcId="{0BB396F2-BB03-431F-9865-24C774031036}" destId="{6BF7DE2A-931E-44C7-9DC2-E8E3C0297739}" srcOrd="0" destOrd="0" presId="urn:microsoft.com/office/officeart/2008/layout/NameandTitleOrganizationalChart"/>
-    <dgm:cxn modelId="{1258918B-AF0F-4991-82B5-E64AB9EDBE3B}" type="presOf" srcId="{B40106DC-A9DC-42BC-904B-C31EB1EA33B6}" destId="{F10327A4-789F-4FD9-91B2-4DBE997718EE}" srcOrd="0" destOrd="0" presId="urn:microsoft.com/office/officeart/2008/layout/NameandTitleOrganizationalChart"/>
-    <dgm:cxn modelId="{7496EA68-5659-4C9E-B6BB-B1359D58BC17}" type="presOf" srcId="{44525E0D-A614-454D-B527-85A9DD18FE1C}" destId="{9234C8BB-D254-499A-9C36-BA272DBBEB10}" srcOrd="0" destOrd="0" presId="urn:microsoft.com/office/officeart/2008/layout/NameandTitleOrganizationalChart"/>
-    <dgm:cxn modelId="{0DEAA453-F9D6-49A4-BC7C-624E8DBD827C}" type="presOf" srcId="{E99A997E-D705-4798-8AE7-844732E114CB}" destId="{84292A0F-DB1A-4F8F-852E-1E17421FB850}" srcOrd="0" destOrd="0" presId="urn:microsoft.com/office/officeart/2008/layout/NameandTitleOrganizationalChart"/>
     <dgm:cxn modelId="{ECB5EF92-F49C-46CF-ACAD-9F37ABE2DB25}" type="presParOf" srcId="{70B3DFA5-88A3-477C-922A-CFEA818C8F70}" destId="{8BED5C40-FF2E-4B01-8702-B45BA1CFDB71}" srcOrd="0" destOrd="0" presId="urn:microsoft.com/office/officeart/2008/layout/NameandTitleOrganizationalChart"/>
     <dgm:cxn modelId="{6FC8CBF4-32C4-4EA7-9628-366386F30BF3}" type="presParOf" srcId="{8BED5C40-FF2E-4B01-8702-B45BA1CFDB71}" destId="{1DABA2AE-78D5-43B1-B0A4-432E02BB2B7F}" srcOrd="0" destOrd="0" presId="urn:microsoft.com/office/officeart/2008/layout/NameandTitleOrganizationalChart"/>
     <dgm:cxn modelId="{3F6E88D5-49F4-4313-A20A-6E7986013BAC}" type="presParOf" srcId="{1DABA2AE-78D5-43B1-B0A4-432E02BB2B7F}" destId="{7CA9E5A9-0401-40F3-8070-7B576D0F4A45}" srcOrd="0" destOrd="0" presId="urn:microsoft.com/office/officeart/2008/layout/NameandTitleOrganizationalChart"/>
@@ -18956,7 +18955,7 @@
             <a:fld id="{A8ADFD5B-A66C-449C-B6E8-FB716D07777D}" type="datetimeFigureOut">
               <a:rPr lang="en-US" smtClean="0"/>
               <a:pPr/>
-              <a:t>4/22/2015</a:t>
+              <a:t>4/23/2015</a:t>
             </a:fld>
             <a:endParaRPr lang="en-US"/>
           </a:p>
@@ -19596,7 +19595,7 @@
                 </a:solidFill>
               </a:rPr>
               <a:pPr algn="ctr"/>
-              <a:t>4/22/2015</a:t>
+              <a:t>4/23/2015</a:t>
             </a:fld>
             <a:endParaRPr kumimoji="0" lang="en-US" sz="2000" dirty="0">
               <a:solidFill>
@@ -19795,7 +19794,7 @@
             <a:fld id="{E4606EA6-EFEA-4C30-9264-4F9291A5780D}" type="datetime1">
               <a:rPr kumimoji="0" lang="en-US" smtClean="0"/>
               <a:pPr/>
-              <a:t>4/22/2015</a:t>
+              <a:t>4/23/2015</a:t>
             </a:fld>
             <a:endParaRPr kumimoji="0" lang="en-US"/>
           </a:p>
@@ -20226,7 +20225,7 @@
             <a:fld id="{6FCF9F07-3BC7-4570-B054-79111B0A380C}" type="datetime1">
               <a:rPr kumimoji="0" lang="en-US" smtClean="0"/>
               <a:pPr/>
-              <a:t>4/22/2015</a:t>
+              <a:t>4/23/2015</a:t>
             </a:fld>
             <a:endParaRPr kumimoji="0" lang="en-US"/>
           </a:p>
@@ -20491,7 +20490,7 @@
             <a:fld id="{E4606EA6-EFEA-4C30-9264-4F9291A5780D}" type="datetime1">
               <a:rPr kumimoji="0" lang="en-US" smtClean="0"/>
               <a:pPr/>
-              <a:t>4/22/2015</a:t>
+              <a:t>4/23/2015</a:t>
             </a:fld>
             <a:endParaRPr kumimoji="0" lang="en-US"/>
           </a:p>
@@ -20746,7 +20745,7 @@
             <a:fld id="{E4606EA6-EFEA-4C30-9264-4F9291A5780D}" type="datetime1">
               <a:rPr kumimoji="0" lang="en-US" smtClean="0"/>
               <a:pPr/>
-              <a:t>4/22/2015</a:t>
+              <a:t>4/23/2015</a:t>
             </a:fld>
             <a:endParaRPr kumimoji="0" lang="en-US"/>
           </a:p>
@@ -20959,7 +20958,7 @@
             <a:fld id="{6DFADB5D-B7A0-47E3-AD2D-B1A6F8614213}" type="datetime1">
               <a:rPr kumimoji="0" lang="en-US" smtClean="0"/>
               <a:pPr/>
-              <a:t>4/22/2015</a:t>
+              <a:t>4/23/2015</a:t>
             </a:fld>
             <a:endParaRPr kumimoji="0" lang="en-US"/>
           </a:p>
@@ -21072,7 +21071,7 @@
             <a:fld id="{72968126-03FC-49C0-B9B8-2B561CCC3D90}" type="datetime1">
               <a:rPr kumimoji="0" lang="en-US" smtClean="0"/>
               <a:pPr/>
-              <a:t>4/22/2015</a:t>
+              <a:t>4/23/2015</a:t>
             </a:fld>
             <a:endParaRPr kumimoji="0" lang="en-US"/>
           </a:p>
@@ -21225,7 +21224,7 @@
             <a:fld id="{F49A8198-4617-485E-9585-4840B69DBBA6}" type="datetime1">
               <a:rPr kumimoji="0" lang="en-US" smtClean="0"/>
               <a:pPr/>
-              <a:t>4/22/2015</a:t>
+              <a:t>4/23/2015</a:t>
             </a:fld>
             <a:endParaRPr kumimoji="0" lang="en-US"/>
           </a:p>
@@ -21814,7 +21813,7 @@
             <a:fld id="{E4606EA6-EFEA-4C30-9264-4F9291A5780D}" type="datetime1">
               <a:rPr kumimoji="0" lang="en-US" smtClean="0"/>
               <a:pPr/>
-              <a:t>4/22/2015</a:t>
+              <a:t>4/23/2015</a:t>
             </a:fld>
             <a:endParaRPr kumimoji="0" lang="en-US"/>
           </a:p>
@@ -22014,7 +22013,7 @@
             <a:fld id="{E4606EA6-EFEA-4C30-9264-4F9291A5780D}" type="datetime1">
               <a:rPr kumimoji="0" lang="en-US" smtClean="0"/>
               <a:pPr/>
-              <a:t>4/22/2015</a:t>
+              <a:t>4/23/2015</a:t>
             </a:fld>
             <a:endParaRPr kumimoji="0" lang="en-US" sz="1400" dirty="0">
               <a:solidFill>
@@ -23290,125 +23289,6 @@
                   </a:outerShdw>
                 </a:effectLst>
               </a:rPr>
-              <a:t>Challenges: </a:t>
-            </a:r>
-            <a:r>
-              <a:rPr lang="en-US" b="1" dirty="0" err="1" smtClean="0">
-                <a:effectLst>
-                  <a:outerShdw blurRad="38100" dist="38100" dir="2700000" algn="tl">
-                    <a:srgbClr val="000000">
-                      <a:alpha val="43137"/>
-                    </a:srgbClr>
-                  </a:outerShdw>
-                </a:effectLst>
-              </a:rPr>
-              <a:t>HaaS</a:t>
-            </a:r>
-            <a:r>
-              <a:rPr lang="en-US" b="1" dirty="0" smtClean="0">
-                <a:effectLst>
-                  <a:outerShdw blurRad="38100" dist="38100" dir="2700000" algn="tl">
-                    <a:srgbClr val="000000">
-                      <a:alpha val="43137"/>
-                    </a:srgbClr>
-                  </a:outerShdw>
-                </a:effectLst>
-              </a:rPr>
-              <a:t> API Calls</a:t>
-            </a:r>
-            <a:endParaRPr lang="en-US" b="1" dirty="0">
-              <a:effectLst>
-                <a:outerShdw blurRad="38100" dist="38100" dir="2700000" algn="tl">
-                  <a:srgbClr val="000000">
-                    <a:alpha val="43137"/>
-                  </a:srgbClr>
-                </a:outerShdw>
-              </a:effectLst>
-            </a:endParaRPr>
-          </a:p>
-        </p:txBody>
-      </p:sp>
-      <p:sp>
-        <p:nvSpPr>
-          <p:cNvPr id="3" name="Content Placeholder 2"/>
-          <p:cNvSpPr>
-            <a:spLocks noGrp="1"/>
-          </p:cNvSpPr>
-          <p:nvPr>
-            <p:ph sz="quarter" idx="13"/>
-          </p:nvPr>
-        </p:nvSpPr>
-        <p:spPr/>
-        <p:txBody>
-          <a:bodyPr/>
-          <a:lstStyle/>
-          <a:p>
-            <a:endParaRPr lang="en-US"/>
-          </a:p>
-        </p:txBody>
-      </p:sp>
-    </p:spTree>
-    <p:extLst>
-      <p:ext uri="{BB962C8B-B14F-4D97-AF65-F5344CB8AC3E}">
-        <p14:creationId xmlns:p14="http://schemas.microsoft.com/office/powerpoint/2010/main" val="2283282918"/>
-      </p:ext>
-    </p:extLst>
-  </p:cSld>
-  <p:clrMapOvr>
-    <a:masterClrMapping/>
-  </p:clrMapOvr>
-  <p:timing>
-    <p:tnLst>
-      <p:par>
-        <p:cTn id="1" dur="indefinite" restart="never" nodeType="tmRoot"/>
-      </p:par>
-    </p:tnLst>
-  </p:timing>
-</p:sld>
-</file>
-
-<file path=ppt/slides/slide13.xml><?xml version="1.0" encoding="utf-8"?>
-<p:sld xmlns:a="http://schemas.openxmlformats.org/drawingml/2006/main" xmlns:r="http://schemas.openxmlformats.org/officeDocument/2006/relationships" xmlns:p="http://schemas.openxmlformats.org/presentationml/2006/main">
-  <p:cSld>
-    <p:spTree>
-      <p:nvGrpSpPr>
-        <p:cNvPr id="1" name=""/>
-        <p:cNvGrpSpPr/>
-        <p:nvPr/>
-      </p:nvGrpSpPr>
-      <p:grpSpPr>
-        <a:xfrm>
-          <a:off x="0" y="0"/>
-          <a:ext cx="0" cy="0"/>
-          <a:chOff x="0" y="0"/>
-          <a:chExt cx="0" cy="0"/>
-        </a:xfrm>
-      </p:grpSpPr>
-      <p:sp>
-        <p:nvSpPr>
-          <p:cNvPr id="2" name="Title 1"/>
-          <p:cNvSpPr>
-            <a:spLocks noGrp="1"/>
-          </p:cNvSpPr>
-          <p:nvPr>
-            <p:ph type="title"/>
-          </p:nvPr>
-        </p:nvSpPr>
-        <p:spPr/>
-        <p:txBody>
-          <a:bodyPr/>
-          <a:lstStyle/>
-          <a:p>
-            <a:r>
-              <a:rPr lang="en-US" b="1" dirty="0" smtClean="0">
-                <a:effectLst>
-                  <a:outerShdw blurRad="38100" dist="38100" dir="2700000" algn="tl">
-                    <a:srgbClr val="000000">
-                      <a:alpha val="43137"/>
-                    </a:srgbClr>
-                  </a:outerShdw>
-                </a:effectLst>
-              </a:rPr>
               <a:t>Overall Status</a:t>
             </a:r>
             <a:endParaRPr lang="en-US" b="1" dirty="0">
@@ -23506,7 +23386,7 @@
 </p:sld>
 </file>
 
-<file path=ppt/slides/slide14.xml><?xml version="1.0" encoding="utf-8"?>
+<file path=ppt/slides/slide13.xml><?xml version="1.0" encoding="utf-8"?>
 <p:sld xmlns:a="http://schemas.openxmlformats.org/drawingml/2006/main" xmlns:r="http://schemas.openxmlformats.org/officeDocument/2006/relationships" xmlns:p="http://schemas.openxmlformats.org/presentationml/2006/main">
   <p:cSld>
     <p:spTree>

</xml_diff>

<commit_message>
Slides Update - Demo4
</commit_message>
<xml_diff>
--- a/MOCUIPlugin-Demo4.pptx
+++ b/MOCUIPlugin-Demo4.pptx
@@ -5,22 +5,23 @@
     <p:sldMasterId id="2147483648" r:id="rId2"/>
   </p:sldMasterIdLst>
   <p:notesMasterIdLst>
-    <p:notesMasterId r:id="rId16"/>
+    <p:notesMasterId r:id="rId17"/>
   </p:notesMasterIdLst>
   <p:sldIdLst>
     <p:sldId id="256" r:id="rId3"/>
-    <p:sldId id="268" r:id="rId4"/>
+    <p:sldId id="279" r:id="rId4"/>
     <p:sldId id="269" r:id="rId5"/>
     <p:sldId id="277" r:id="rId6"/>
     <p:sldId id="270" r:id="rId7"/>
-    <p:sldId id="274" r:id="rId8"/>
-    <p:sldId id="266" r:id="rId9"/>
-    <p:sldId id="275" r:id="rId10"/>
-    <p:sldId id="276" r:id="rId11"/>
-    <p:sldId id="278" r:id="rId12"/>
-    <p:sldId id="272" r:id="rId13"/>
-    <p:sldId id="271" r:id="rId14"/>
-    <p:sldId id="265" r:id="rId15"/>
+    <p:sldId id="280" r:id="rId8"/>
+    <p:sldId id="274" r:id="rId9"/>
+    <p:sldId id="266" r:id="rId10"/>
+    <p:sldId id="275" r:id="rId11"/>
+    <p:sldId id="276" r:id="rId12"/>
+    <p:sldId id="278" r:id="rId13"/>
+    <p:sldId id="272" r:id="rId14"/>
+    <p:sldId id="271" r:id="rId15"/>
+    <p:sldId id="265" r:id="rId16"/>
   </p:sldIdLst>
   <p:sldSz cx="9144000" cy="5143500" type="screen16x9"/>
   <p:notesSz cx="6858000" cy="9144000"/>
@@ -23070,6 +23071,182 @@
             <p:ph type="title"/>
           </p:nvPr>
         </p:nvSpPr>
+        <p:spPr/>
+        <p:txBody>
+          <a:bodyPr>
+            <a:normAutofit fontScale="90000"/>
+          </a:bodyPr>
+          <a:lstStyle/>
+          <a:p>
+            <a:r>
+              <a:rPr lang="en-US" b="1" dirty="0" smtClean="0">
+                <a:effectLst>
+                  <a:outerShdw blurRad="38100" dist="38100" dir="2700000" algn="tl">
+                    <a:srgbClr val="000000">
+                      <a:alpha val="43137"/>
+                    </a:srgbClr>
+                  </a:outerShdw>
+                </a:effectLst>
+              </a:rPr>
+              <a:t>Refactoring – App Structure and URLS</a:t>
+            </a:r>
+            <a:endParaRPr lang="en-US" b="1" dirty="0">
+              <a:effectLst>
+                <a:outerShdw blurRad="38100" dist="38100" dir="2700000" algn="tl">
+                  <a:srgbClr val="000000">
+                    <a:alpha val="43137"/>
+                  </a:srgbClr>
+                </a:outerShdw>
+              </a:effectLst>
+            </a:endParaRPr>
+          </a:p>
+        </p:txBody>
+      </p:sp>
+      <p:graphicFrame>
+        <p:nvGraphicFramePr>
+          <p:cNvPr id="4" name="Content Placeholder 3"/>
+          <p:cNvGraphicFramePr>
+            <a:graphicFrameLocks noGrp="1"/>
+          </p:cNvGraphicFramePr>
+          <p:nvPr>
+            <p:ph sz="quarter" idx="13"/>
+            <p:extLst>
+              <p:ext uri="{D42A27DB-BD31-4B8C-83A1-F6EECF244321}">
+                <p14:modId xmlns:p14="http://schemas.microsoft.com/office/powerpoint/2010/main" val="2470999424"/>
+              </p:ext>
+            </p:extLst>
+          </p:nvPr>
+        </p:nvGraphicFramePr>
+        <p:xfrm>
+          <a:off x="457200" y="1276350"/>
+          <a:ext cx="8153400" cy="3581400"/>
+        </p:xfrm>
+        <a:graphic>
+          <a:graphicData uri="http://schemas.openxmlformats.org/drawingml/2006/diagram">
+            <dgm:relIds xmlns:dgm="http://schemas.openxmlformats.org/drawingml/2006/diagram" xmlns:r="http://schemas.openxmlformats.org/officeDocument/2006/relationships" r:dm="rId2" r:lo="rId3" r:qs="rId4" r:cs="rId5"/>
+          </a:graphicData>
+        </a:graphic>
+      </p:graphicFrame>
+    </p:spTree>
+    <p:extLst>
+      <p:ext uri="{BB962C8B-B14F-4D97-AF65-F5344CB8AC3E}">
+        <p14:creationId xmlns:p14="http://schemas.microsoft.com/office/powerpoint/2010/main" val="1284930405"/>
+      </p:ext>
+    </p:extLst>
+  </p:cSld>
+  <p:clrMapOvr>
+    <a:masterClrMapping/>
+  </p:clrMapOvr>
+  <p:timing>
+    <p:tnLst>
+      <p:par>
+        <p:cTn id="1" dur="indefinite" restart="never" nodeType="tmRoot">
+          <p:childTnLst>
+            <p:seq concurrent="1" nextAc="seek">
+              <p:cTn id="2" dur="indefinite" nodeType="mainSeq">
+                <p:childTnLst>
+                  <p:par>
+                    <p:cTn id="3" fill="hold">
+                      <p:stCondLst>
+                        <p:cond delay="indefinite"/>
+                      </p:stCondLst>
+                      <p:childTnLst>
+                        <p:par>
+                          <p:cTn id="4" fill="hold">
+                            <p:stCondLst>
+                              <p:cond delay="0"/>
+                            </p:stCondLst>
+                            <p:childTnLst>
+                              <p:par>
+                                <p:cTn id="5" presetID="1" presetClass="entr" presetSubtype="0" fill="hold" grpId="0" nodeType="clickEffect">
+                                  <p:stCondLst>
+                                    <p:cond delay="0"/>
+                                  </p:stCondLst>
+                                  <p:childTnLst>
+                                    <p:set>
+                                      <p:cBhvr>
+                                        <p:cTn id="6" dur="1" fill="hold">
+                                          <p:stCondLst>
+                                            <p:cond delay="0"/>
+                                          </p:stCondLst>
+                                        </p:cTn>
+                                        <p:tgtEl>
+                                          <p:spTgt spid="4"/>
+                                        </p:tgtEl>
+                                        <p:attrNameLst>
+                                          <p:attrName>style.visibility</p:attrName>
+                                        </p:attrNameLst>
+                                      </p:cBhvr>
+                                      <p:to>
+                                        <p:strVal val="visible"/>
+                                      </p:to>
+                                    </p:set>
+                                  </p:childTnLst>
+                                </p:cTn>
+                              </p:par>
+                            </p:childTnLst>
+                          </p:cTn>
+                        </p:par>
+                      </p:childTnLst>
+                    </p:cTn>
+                  </p:par>
+                </p:childTnLst>
+              </p:cTn>
+              <p:prevCondLst>
+                <p:cond evt="onPrev" delay="0">
+                  <p:tgtEl>
+                    <p:sldTgt/>
+                  </p:tgtEl>
+                </p:cond>
+              </p:prevCondLst>
+              <p:nextCondLst>
+                <p:cond evt="onNext" delay="0">
+                  <p:tgtEl>
+                    <p:sldTgt/>
+                  </p:tgtEl>
+                </p:cond>
+              </p:nextCondLst>
+            </p:seq>
+          </p:childTnLst>
+        </p:cTn>
+      </p:par>
+    </p:tnLst>
+    <p:bldLst>
+      <p:bldGraphic spid="4" grpId="0">
+        <p:bldAsOne/>
+      </p:bldGraphic>
+    </p:bldLst>
+  </p:timing>
+</p:sld>
+</file>
+
+<file path=ppt/slides/slide11.xml><?xml version="1.0" encoding="utf-8"?>
+<p:sld xmlns:a="http://schemas.openxmlformats.org/drawingml/2006/main" xmlns:r="http://schemas.openxmlformats.org/officeDocument/2006/relationships" xmlns:p="http://schemas.openxmlformats.org/presentationml/2006/main">
+  <p:cSld>
+    <p:spTree>
+      <p:nvGrpSpPr>
+        <p:cNvPr id="1" name=""/>
+        <p:cNvGrpSpPr/>
+        <p:nvPr/>
+      </p:nvGrpSpPr>
+      <p:grpSpPr>
+        <a:xfrm>
+          <a:off x="0" y="0"/>
+          <a:ext cx="0" cy="0"/>
+          <a:chOff x="0" y="0"/>
+          <a:chExt cx="0" cy="0"/>
+        </a:xfrm>
+      </p:grpSpPr>
+      <p:sp>
+        <p:nvSpPr>
+          <p:cNvPr id="2" name="Title 1"/>
+          <p:cNvSpPr>
+            <a:spLocks noGrp="1"/>
+          </p:cNvSpPr>
+          <p:nvPr>
+            <p:ph type="title"/>
+          </p:nvPr>
+        </p:nvSpPr>
         <p:spPr>
           <a:xfrm>
             <a:off x="2819400" y="1809750"/>
@@ -23126,7 +23303,7 @@
 </p:sld>
 </file>
 
-<file path=ppt/slides/slide11.xml><?xml version="1.0" encoding="utf-8"?>
+<file path=ppt/slides/slide12.xml><?xml version="1.0" encoding="utf-8"?>
 <p:sld xmlns:a="http://schemas.openxmlformats.org/drawingml/2006/main" xmlns:r="http://schemas.openxmlformats.org/officeDocument/2006/relationships" xmlns:p="http://schemas.openxmlformats.org/presentationml/2006/main">
   <p:cSld>
     <p:spTree>
@@ -23247,7 +23424,7 @@
 </p:sld>
 </file>
 
-<file path=ppt/slides/slide12.xml><?xml version="1.0" encoding="utf-8"?>
+<file path=ppt/slides/slide13.xml><?xml version="1.0" encoding="utf-8"?>
 <p:sld xmlns:a="http://schemas.openxmlformats.org/drawingml/2006/main" xmlns:r="http://schemas.openxmlformats.org/officeDocument/2006/relationships" xmlns:p="http://schemas.openxmlformats.org/presentationml/2006/main">
   <p:cSld>
     <p:spTree>
@@ -23320,7 +23497,19 @@
           <a:p>
             <a:r>
               <a:rPr lang="en-US" dirty="0" smtClean="0"/>
-              <a:t>Initial Project Description Stretched </a:t>
+              <a:t>Initial Project </a:t>
+            </a:r>
+            <a:r>
+              <a:rPr lang="en-US" dirty="0" smtClean="0"/>
+              <a:t>Requirements</a:t>
+            </a:r>
+            <a:r>
+              <a:rPr lang="en-US" dirty="0" smtClean="0"/>
+              <a:t> </a:t>
+            </a:r>
+            <a:r>
+              <a:rPr lang="en-US" dirty="0" smtClean="0"/>
+              <a:t>Stretched </a:t>
             </a:r>
           </a:p>
           <a:p>
@@ -23386,7 +23575,7 @@
 </p:sld>
 </file>
 
-<file path=ppt/slides/slide13.xml><?xml version="1.0" encoding="utf-8"?>
+<file path=ppt/slides/slide14.xml><?xml version="1.0" encoding="utf-8"?>
 <p:sld xmlns:a="http://schemas.openxmlformats.org/drawingml/2006/main" xmlns:r="http://schemas.openxmlformats.org/officeDocument/2006/relationships" xmlns:p="http://schemas.openxmlformats.org/presentationml/2006/main">
   <p:cSld>
     <p:spTree>
@@ -23484,38 +23673,10 @@
           <a:lstStyle/>
           <a:p>
             <a:r>
-              <a:rPr lang="en-US" b="1" dirty="0" smtClean="0">
-                <a:effectLst>
-                  <a:outerShdw blurRad="38100" dist="38100" dir="2700000" algn="tl">
-                    <a:srgbClr val="000000">
-                      <a:alpha val="43137"/>
-                    </a:srgbClr>
-                  </a:outerShdw>
-                </a:effectLst>
-              </a:rPr>
-              <a:t>MOC UI Plugin/</a:t>
+              <a:rPr lang="en-US" dirty="0" smtClean="0"/>
+              <a:t>Project Overview</a:t>
             </a:r>
-            <a:r>
-              <a:rPr lang="en-US" b="1" dirty="0" err="1" smtClean="0">
-                <a:effectLst>
-                  <a:outerShdw blurRad="38100" dist="38100" dir="2700000" algn="tl">
-                    <a:srgbClr val="000000">
-                      <a:alpha val="43137"/>
-                    </a:srgbClr>
-                  </a:outerShdw>
-                </a:effectLst>
-              </a:rPr>
-              <a:t>HaaS</a:t>
-            </a:r>
-            <a:endParaRPr lang="en-US" b="1" dirty="0">
-              <a:effectLst>
-                <a:outerShdw blurRad="38100" dist="38100" dir="2700000" algn="tl">
-                  <a:srgbClr val="000000">
-                    <a:alpha val="43137"/>
-                  </a:srgbClr>
-                </a:outerShdw>
-              </a:effectLst>
-            </a:endParaRPr>
+            <a:endParaRPr lang="en-US" dirty="0"/>
           </a:p>
         </p:txBody>
       </p:sp>
@@ -23531,9 +23692,61 @@
         </p:nvSpPr>
         <p:spPr/>
         <p:txBody>
-          <a:bodyPr/>
+          <a:bodyPr>
+            <a:normAutofit/>
+          </a:bodyPr>
           <a:lstStyle/>
           <a:p>
+            <a:r>
+              <a:rPr lang="en-US" dirty="0" smtClean="0"/>
+              <a:t>Plugin for MOC-UI</a:t>
+            </a:r>
+          </a:p>
+          <a:p>
+            <a:pPr lvl="1"/>
+            <a:r>
+              <a:rPr lang="en-US" dirty="0"/>
+              <a:t>A</a:t>
+            </a:r>
+            <a:r>
+              <a:rPr lang="en-US" dirty="0" smtClean="0"/>
+              <a:t>llow </a:t>
+            </a:r>
+            <a:r>
+              <a:rPr lang="en-US" dirty="0"/>
+              <a:t>external web apps to be integrated into </a:t>
+            </a:r>
+            <a:r>
+              <a:rPr lang="en-US" dirty="0" smtClean="0"/>
+              <a:t>MOC-UI</a:t>
+            </a:r>
+          </a:p>
+          <a:p>
+            <a:r>
+              <a:rPr lang="en-US" dirty="0" smtClean="0"/>
+              <a:t>HaaS</a:t>
+            </a:r>
+          </a:p>
+          <a:p>
+            <a:pPr lvl="1"/>
+            <a:r>
+              <a:rPr lang="en-US" dirty="0" smtClean="0"/>
+              <a:t>Test </a:t>
+            </a:r>
+            <a:r>
+              <a:rPr lang="en-US" dirty="0"/>
+              <a:t>case: implement a web app to manage projects using </a:t>
+            </a:r>
+            <a:r>
+              <a:rPr lang="en-US" dirty="0" smtClean="0"/>
+              <a:t>HaaS</a:t>
+            </a:r>
+          </a:p>
+          <a:p>
+            <a:r>
+              <a:rPr lang="en-US" dirty="0" smtClean="0"/>
+              <a:t>Integration of HaaS app into MOC-UI</a:t>
+            </a:r>
             <a:endParaRPr lang="en-US" dirty="0"/>
           </a:p>
         </p:txBody>
@@ -23541,7 +23754,7 @@
     </p:spTree>
     <p:extLst>
       <p:ext uri="{BB962C8B-B14F-4D97-AF65-F5344CB8AC3E}">
-        <p14:creationId xmlns:p14="http://schemas.microsoft.com/office/powerpoint/2010/main" val="1787903124"/>
+        <p14:creationId xmlns:p14="http://schemas.microsoft.com/office/powerpoint/2010/main" val="2333812729"/>
       </p:ext>
     </p:extLst>
   </p:cSld>
@@ -24269,6 +24482,101 @@
           <a:lstStyle/>
           <a:p>
             <a:r>
+              <a:rPr lang="en-US" dirty="0" smtClean="0"/>
+              <a:t>Current Sprint – Not Done</a:t>
+            </a:r>
+            <a:endParaRPr lang="en-US" dirty="0"/>
+          </a:p>
+        </p:txBody>
+      </p:sp>
+      <p:sp>
+        <p:nvSpPr>
+          <p:cNvPr id="3" name="Content Placeholder 2"/>
+          <p:cNvSpPr>
+            <a:spLocks noGrp="1"/>
+          </p:cNvSpPr>
+          <p:nvPr>
+            <p:ph sz="quarter" idx="13"/>
+          </p:nvPr>
+        </p:nvSpPr>
+        <p:spPr/>
+        <p:txBody>
+          <a:bodyPr/>
+          <a:lstStyle/>
+          <a:p>
+            <a:r>
+              <a:rPr lang="en-US" dirty="0" smtClean="0"/>
+              <a:t>Manage VLANS</a:t>
+            </a:r>
+          </a:p>
+          <a:p>
+            <a:pPr marL="0" indent="0">
+              <a:buNone/>
+            </a:pPr>
+            <a:endParaRPr lang="en-US" dirty="0" smtClean="0"/>
+          </a:p>
+          <a:p>
+            <a:r>
+              <a:rPr lang="en-US" dirty="0" smtClean="0"/>
+              <a:t>Connect/Disconnect HNICs to Networks</a:t>
+            </a:r>
+            <a:endParaRPr lang="en-US" dirty="0"/>
+          </a:p>
+        </p:txBody>
+      </p:sp>
+    </p:spTree>
+    <p:extLst>
+      <p:ext uri="{BB962C8B-B14F-4D97-AF65-F5344CB8AC3E}">
+        <p14:creationId xmlns:p14="http://schemas.microsoft.com/office/powerpoint/2010/main" val="4197813773"/>
+      </p:ext>
+    </p:extLst>
+  </p:cSld>
+  <p:clrMapOvr>
+    <a:masterClrMapping/>
+  </p:clrMapOvr>
+  <p:timing>
+    <p:tnLst>
+      <p:par>
+        <p:cTn id="1" dur="indefinite" restart="never" nodeType="tmRoot"/>
+      </p:par>
+    </p:tnLst>
+  </p:timing>
+</p:sld>
+</file>
+
+<file path=ppt/slides/slide7.xml><?xml version="1.0" encoding="utf-8"?>
+<p:sld xmlns:a="http://schemas.openxmlformats.org/drawingml/2006/main" xmlns:r="http://schemas.openxmlformats.org/officeDocument/2006/relationships" xmlns:p="http://schemas.openxmlformats.org/presentationml/2006/main">
+  <p:cSld>
+    <p:spTree>
+      <p:nvGrpSpPr>
+        <p:cNvPr id="1" name=""/>
+        <p:cNvGrpSpPr/>
+        <p:nvPr/>
+      </p:nvGrpSpPr>
+      <p:grpSpPr>
+        <a:xfrm>
+          <a:off x="0" y="0"/>
+          <a:ext cx="0" cy="0"/>
+          <a:chOff x="0" y="0"/>
+          <a:chExt cx="0" cy="0"/>
+        </a:xfrm>
+      </p:grpSpPr>
+      <p:sp>
+        <p:nvSpPr>
+          <p:cNvPr id="2" name="Title 1"/>
+          <p:cNvSpPr>
+            <a:spLocks noGrp="1"/>
+          </p:cNvSpPr>
+          <p:nvPr>
+            <p:ph type="title"/>
+          </p:nvPr>
+        </p:nvSpPr>
+        <p:spPr/>
+        <p:txBody>
+          <a:bodyPr/>
+          <a:lstStyle/>
+          <a:p>
+            <a:r>
               <a:rPr lang="en-US" b="1" dirty="0" err="1" smtClean="0">
                 <a:effectLst>
                   <a:outerShdw blurRad="38100" dist="38100" dir="2700000" algn="tl">
@@ -24292,25 +24600,29 @@
           </a:p>
         </p:txBody>
       </p:sp>
-      <p:sp>
-        <p:nvSpPr>
-          <p:cNvPr id="3" name="Content Placeholder 2"/>
-          <p:cNvSpPr>
-            <a:spLocks noGrp="1"/>
-          </p:cNvSpPr>
-          <p:nvPr>
-            <p:ph sz="quarter" idx="13"/>
-          </p:nvPr>
-        </p:nvSpPr>
-        <p:spPr/>
-        <p:txBody>
-          <a:bodyPr/>
-          <a:lstStyle/>
-          <a:p>
-            <a:endParaRPr lang="en-US"/>
-          </a:p>
-        </p:txBody>
-      </p:sp>
+      <p:pic>
+        <p:nvPicPr>
+          <p:cNvPr id="4" name="Picture 3"/>
+          <p:cNvPicPr>
+            <a:picLocks noChangeAspect="1"/>
+          </p:cNvPicPr>
+          <p:nvPr/>
+        </p:nvPicPr>
+        <p:blipFill rotWithShape="1">
+          <a:blip r:embed="rId2"/>
+          <a:srcRect l="31728" t="36050" r="11303" b="16035"/>
+          <a:stretch/>
+        </p:blipFill>
+        <p:spPr>
+          <a:xfrm>
+            <a:off x="304800" y="1504950"/>
+            <a:ext cx="8279671" cy="3124200"/>
+          </a:xfrm>
+          <a:prstGeom prst="rect">
+            <a:avLst/>
+          </a:prstGeom>
+        </p:spPr>
+      </p:pic>
     </p:spTree>
     <p:extLst>
       <p:ext uri="{BB962C8B-B14F-4D97-AF65-F5344CB8AC3E}">
@@ -24331,7 +24643,7 @@
 </p:sld>
 </file>
 
-<file path=ppt/slides/slide7.xml><?xml version="1.0" encoding="utf-8"?>
+<file path=ppt/slides/slide8.xml><?xml version="1.0" encoding="utf-8"?>
 <p:sld xmlns:a="http://schemas.openxmlformats.org/drawingml/2006/main" xmlns:r="http://schemas.openxmlformats.org/officeDocument/2006/relationships" xmlns:p="http://schemas.openxmlformats.org/presentationml/2006/main">
   <p:cSld>
     <p:spTree>
@@ -24434,7 +24746,7 @@
 </p:sld>
 </file>
 
-<file path=ppt/slides/slide8.xml><?xml version="1.0" encoding="utf-8"?>
+<file path=ppt/slides/slide9.xml><?xml version="1.0" encoding="utf-8"?>
 <p:sld xmlns:a="http://schemas.openxmlformats.org/drawingml/2006/main" xmlns:r="http://schemas.openxmlformats.org/officeDocument/2006/relationships" xmlns:p="http://schemas.openxmlformats.org/presentationml/2006/main">
   <p:cSld>
     <p:spTree>
@@ -24533,182 +24845,6 @@
         <p:cTn id="1" dur="indefinite" restart="never" nodeType="tmRoot"/>
       </p:par>
     </p:tnLst>
-  </p:timing>
-</p:sld>
-</file>
-
-<file path=ppt/slides/slide9.xml><?xml version="1.0" encoding="utf-8"?>
-<p:sld xmlns:a="http://schemas.openxmlformats.org/drawingml/2006/main" xmlns:r="http://schemas.openxmlformats.org/officeDocument/2006/relationships" xmlns:p="http://schemas.openxmlformats.org/presentationml/2006/main">
-  <p:cSld>
-    <p:spTree>
-      <p:nvGrpSpPr>
-        <p:cNvPr id="1" name=""/>
-        <p:cNvGrpSpPr/>
-        <p:nvPr/>
-      </p:nvGrpSpPr>
-      <p:grpSpPr>
-        <a:xfrm>
-          <a:off x="0" y="0"/>
-          <a:ext cx="0" cy="0"/>
-          <a:chOff x="0" y="0"/>
-          <a:chExt cx="0" cy="0"/>
-        </a:xfrm>
-      </p:grpSpPr>
-      <p:sp>
-        <p:nvSpPr>
-          <p:cNvPr id="2" name="Title 1"/>
-          <p:cNvSpPr>
-            <a:spLocks noGrp="1"/>
-          </p:cNvSpPr>
-          <p:nvPr>
-            <p:ph type="title"/>
-          </p:nvPr>
-        </p:nvSpPr>
-        <p:spPr/>
-        <p:txBody>
-          <a:bodyPr>
-            <a:normAutofit fontScale="90000"/>
-          </a:bodyPr>
-          <a:lstStyle/>
-          <a:p>
-            <a:r>
-              <a:rPr lang="en-US" b="1" dirty="0" smtClean="0">
-                <a:effectLst>
-                  <a:outerShdw blurRad="38100" dist="38100" dir="2700000" algn="tl">
-                    <a:srgbClr val="000000">
-                      <a:alpha val="43137"/>
-                    </a:srgbClr>
-                  </a:outerShdw>
-                </a:effectLst>
-              </a:rPr>
-              <a:t>Refactoring – App Structure and URLS</a:t>
-            </a:r>
-            <a:endParaRPr lang="en-US" b="1" dirty="0">
-              <a:effectLst>
-                <a:outerShdw blurRad="38100" dist="38100" dir="2700000" algn="tl">
-                  <a:srgbClr val="000000">
-                    <a:alpha val="43137"/>
-                  </a:srgbClr>
-                </a:outerShdw>
-              </a:effectLst>
-            </a:endParaRPr>
-          </a:p>
-        </p:txBody>
-      </p:sp>
-      <p:graphicFrame>
-        <p:nvGraphicFramePr>
-          <p:cNvPr id="4" name="Content Placeholder 3"/>
-          <p:cNvGraphicFramePr>
-            <a:graphicFrameLocks noGrp="1"/>
-          </p:cNvGraphicFramePr>
-          <p:nvPr>
-            <p:ph sz="quarter" idx="13"/>
-            <p:extLst>
-              <p:ext uri="{D42A27DB-BD31-4B8C-83A1-F6EECF244321}">
-                <p14:modId xmlns:p14="http://schemas.microsoft.com/office/powerpoint/2010/main" val="2470999424"/>
-              </p:ext>
-            </p:extLst>
-          </p:nvPr>
-        </p:nvGraphicFramePr>
-        <p:xfrm>
-          <a:off x="457200" y="1276350"/>
-          <a:ext cx="8153400" cy="3581400"/>
-        </p:xfrm>
-        <a:graphic>
-          <a:graphicData uri="http://schemas.openxmlformats.org/drawingml/2006/diagram">
-            <dgm:relIds xmlns:dgm="http://schemas.openxmlformats.org/drawingml/2006/diagram" xmlns:r="http://schemas.openxmlformats.org/officeDocument/2006/relationships" r:dm="rId2" r:lo="rId3" r:qs="rId4" r:cs="rId5"/>
-          </a:graphicData>
-        </a:graphic>
-      </p:graphicFrame>
-    </p:spTree>
-    <p:extLst>
-      <p:ext uri="{BB962C8B-B14F-4D97-AF65-F5344CB8AC3E}">
-        <p14:creationId xmlns:p14="http://schemas.microsoft.com/office/powerpoint/2010/main" val="1284930405"/>
-      </p:ext>
-    </p:extLst>
-  </p:cSld>
-  <p:clrMapOvr>
-    <a:masterClrMapping/>
-  </p:clrMapOvr>
-  <p:timing>
-    <p:tnLst>
-      <p:par>
-        <p:cTn id="1" dur="indefinite" restart="never" nodeType="tmRoot">
-          <p:childTnLst>
-            <p:seq concurrent="1" nextAc="seek">
-              <p:cTn id="2" dur="indefinite" nodeType="mainSeq">
-                <p:childTnLst>
-                  <p:par>
-                    <p:cTn id="3" fill="hold">
-                      <p:stCondLst>
-                        <p:cond delay="indefinite"/>
-                      </p:stCondLst>
-                      <p:childTnLst>
-                        <p:par>
-                          <p:cTn id="4" fill="hold">
-                            <p:stCondLst>
-                              <p:cond delay="0"/>
-                            </p:stCondLst>
-                            <p:childTnLst>
-                              <p:par>
-                                <p:cTn id="5" presetID="1" presetClass="entr" presetSubtype="0" fill="hold" grpId="0" nodeType="clickEffect">
-                                  <p:stCondLst>
-                                    <p:cond delay="0"/>
-                                  </p:stCondLst>
-                                  <p:childTnLst>
-                                    <p:set>
-                                      <p:cBhvr>
-                                        <p:cTn id="6" dur="1" fill="hold">
-                                          <p:stCondLst>
-                                            <p:cond delay="0"/>
-                                          </p:stCondLst>
-                                        </p:cTn>
-                                        <p:tgtEl>
-                                          <p:spTgt spid="4"/>
-                                        </p:tgtEl>
-                                        <p:attrNameLst>
-                                          <p:attrName>style.visibility</p:attrName>
-                                        </p:attrNameLst>
-                                      </p:cBhvr>
-                                      <p:to>
-                                        <p:strVal val="visible"/>
-                                      </p:to>
-                                    </p:set>
-                                  </p:childTnLst>
-                                </p:cTn>
-                              </p:par>
-                            </p:childTnLst>
-                          </p:cTn>
-                        </p:par>
-                      </p:childTnLst>
-                    </p:cTn>
-                  </p:par>
-                </p:childTnLst>
-              </p:cTn>
-              <p:prevCondLst>
-                <p:cond evt="onPrev" delay="0">
-                  <p:tgtEl>
-                    <p:sldTgt/>
-                  </p:tgtEl>
-                </p:cond>
-              </p:prevCondLst>
-              <p:nextCondLst>
-                <p:cond evt="onNext" delay="0">
-                  <p:tgtEl>
-                    <p:sldTgt/>
-                  </p:tgtEl>
-                </p:cond>
-              </p:nextCondLst>
-            </p:seq>
-          </p:childTnLst>
-        </p:cTn>
-      </p:par>
-    </p:tnLst>
-    <p:bldLst>
-      <p:bldGraphic spid="4" grpId="0">
-        <p:bldAsOne/>
-      </p:bldGraphic>
-    </p:bldLst>
   </p:timing>
 </p:sld>
 </file>

</xml_diff>

<commit_message>
Slide Update - Demo 4
</commit_message>
<xml_diff>
--- a/MOCUIPlugin-Demo4.pptx
+++ b/MOCUIPlugin-Demo4.pptx
@@ -23867,8 +23867,21 @@
                   <a:prstClr val="black"/>
                 </a:solidFill>
               </a:rPr>
-              <a:t> APIs:</a:t>
+              <a:t> </a:t>
             </a:r>
+            <a:r>
+              <a:rPr lang="en-US" dirty="0" smtClean="0">
+                <a:solidFill>
+                  <a:prstClr val="black"/>
+                </a:solidFill>
+              </a:rPr>
+              <a:t>API calls:</a:t>
+            </a:r>
+            <a:endParaRPr lang="en-US" dirty="0">
+              <a:solidFill>
+                <a:prstClr val="black"/>
+              </a:solidFill>
+            </a:endParaRPr>
           </a:p>
           <a:p>
             <a:pPr lvl="1"/>
@@ -24371,12 +24384,12 @@
               <a:t>(13) </a:t>
             </a:r>
             <a:r>
-              <a:rPr lang="en-US" sz="1800" dirty="0" err="1" smtClean="0"/>
-              <a:t>Redsign</a:t>
+              <a:rPr lang="en-US" sz="1800" dirty="0" smtClean="0"/>
+              <a:t>Redesign </a:t>
             </a:r>
             <a:r>
               <a:rPr lang="en-US" sz="1800" dirty="0" smtClean="0"/>
-              <a:t> Node Details [30]</a:t>
+              <a:t>Node Details [30]</a:t>
             </a:r>
           </a:p>
           <a:p>

</xml_diff>